<commit_message>
updated ppt with Neo4j content
</commit_message>
<xml_diff>
--- a/Team_Alpha_Presentation.pptx
+++ b/Team_Alpha_Presentation.pptx
@@ -14,9 +14,11 @@
     <p:sldId id="259" r:id="rId8"/>
     <p:sldId id="271" r:id="rId9"/>
     <p:sldId id="256" r:id="rId10"/>
-    <p:sldId id="267" r:id="rId11"/>
-    <p:sldId id="272" r:id="rId12"/>
-    <p:sldId id="264" r:id="rId13"/>
+    <p:sldId id="274" r:id="rId11"/>
+    <p:sldId id="267" r:id="rId12"/>
+    <p:sldId id="273" r:id="rId13"/>
+    <p:sldId id="272" r:id="rId14"/>
+    <p:sldId id="264" r:id="rId15"/>
   </p:sldIdLst>
   <p:sldSz cx="12192000" cy="6858000"/>
   <p:notesSz cx="6858000" cy="9144000"/>
@@ -4289,7 +4291,7 @@
           <a:p>
             <a:r>
               <a:rPr lang="en-US" sz="4000" b="1" dirty="0"/>
-              <a:t>Alert Correlation Engine using Mutual Information</a:t>
+              <a:t>Design Alert Correlation Engine using Mutual Information</a:t>
             </a:r>
             <a:br>
               <a:rPr lang="en-US" sz="4000" b="1" dirty="0"/>
@@ -4322,7 +4324,7 @@
             <a:pPr algn="r"/>
             <a:r>
               <a:rPr lang="en-US" b="1" dirty="0"/>
-              <a:t>CS-410 – Fall 2020</a:t>
+              <a:t>CS-410 – Fall 2021</a:t>
             </a:r>
           </a:p>
           <a:p>
@@ -4336,21 +4338,21 @@
             <a:pPr algn="r"/>
             <a:r>
               <a:rPr lang="en-US" sz="1600" dirty="0"/>
-              <a:t>Abhijit Bhadra()</a:t>
+              <a:t>Abhijit Bhadra</a:t>
             </a:r>
           </a:p>
           <a:p>
             <a:pPr algn="r"/>
             <a:r>
               <a:rPr lang="en-US" sz="1600" dirty="0"/>
-              <a:t>Sanjeev Kumar()</a:t>
+              <a:t>Sanjeev Kumar</a:t>
             </a:r>
           </a:p>
           <a:p>
             <a:pPr algn="r"/>
             <a:r>
               <a:rPr lang="en-US" sz="1600" dirty="0"/>
-              <a:t>Swati Nanda()</a:t>
+              <a:t>Swati Nanda</a:t>
             </a:r>
           </a:p>
         </p:txBody>
@@ -4371,6 +4373,14 @@
 <file path=ppt/slides/slide10.xml><?xml version="1.0" encoding="utf-8"?>
 <p:sld xmlns:a="http://schemas.openxmlformats.org/drawingml/2006/main" xmlns:r="http://schemas.openxmlformats.org/officeDocument/2006/relationships" xmlns:p="http://schemas.openxmlformats.org/presentationml/2006/main">
   <p:cSld>
+    <p:bg>
+      <p:bgPr>
+        <a:solidFill>
+          <a:schemeClr val="bg1"/>
+        </a:solidFill>
+        <a:effectLst/>
+      </p:bgPr>
+    </p:bg>
     <p:spTree>
       <p:nvGrpSpPr>
         <p:cNvPr id="1" name=""/>
@@ -4385,168 +4395,440 @@
           <a:chExt cx="0" cy="0"/>
         </a:xfrm>
       </p:grpSpPr>
+      <p:cxnSp>
+        <p:nvCxnSpPr>
+          <p:cNvPr id="17" name="Straight Connector 16">
+            <a:extLst>
+              <a:ext uri="{FF2B5EF4-FFF2-40B4-BE49-F238E27FC236}">
+                <a16:creationId xmlns:a16="http://schemas.microsoft.com/office/drawing/2014/main" id="{108D74AC-B125-4E11-BA53-E9E383966DF8}"/>
+              </a:ext>
+              <a:ext uri="{C183D7F6-B498-43B3-948B-1728B52AA6E4}">
+                <adec:decorative xmlns:adec="http://schemas.microsoft.com/office/drawing/2017/decorative" val="1"/>
+              </a:ext>
+            </a:extLst>
+          </p:cNvPr>
+          <p:cNvCxnSpPr>
+            <a:cxnSpLocks noGrp="1" noRot="1" noChangeAspect="1" noMove="1" noResize="1" noEditPoints="1" noAdjustHandles="1" noChangeArrowheads="1" noChangeShapeType="1"/>
+          </p:cNvCxnSpPr>
+          <p:nvPr>
+            <p:extLst>
+              <p:ext uri="{386F3935-93C4-4BCD-93E2-E3B085C9AB24}">
+                <p16:designElem xmlns:p16="http://schemas.microsoft.com/office/powerpoint/2015/main" val="1"/>
+              </p:ext>
+            </p:extLst>
+          </p:nvPr>
+        </p:nvCxnSpPr>
+        <p:spPr>
+          <a:xfrm>
+            <a:off x="482600" y="489855"/>
+            <a:ext cx="11147071" cy="0"/>
+          </a:xfrm>
+          <a:prstGeom prst="line">
+            <a:avLst/>
+          </a:prstGeom>
+          <a:ln w="28575">
+            <a:solidFill>
+              <a:schemeClr val="tx2"/>
+            </a:solidFill>
+          </a:ln>
+        </p:spPr>
+        <p:style>
+          <a:lnRef idx="1">
+            <a:schemeClr val="dk1"/>
+          </a:lnRef>
+          <a:fillRef idx="0">
+            <a:schemeClr val="dk1"/>
+          </a:fillRef>
+          <a:effectRef idx="0">
+            <a:schemeClr val="dk1"/>
+          </a:effectRef>
+          <a:fontRef idx="minor">
+            <a:schemeClr val="tx1"/>
+          </a:fontRef>
+        </p:style>
+      </p:cxnSp>
+      <p:cxnSp>
+        <p:nvCxnSpPr>
+          <p:cNvPr id="19" name="Straight Connector 18">
+            <a:extLst>
+              <a:ext uri="{FF2B5EF4-FFF2-40B4-BE49-F238E27FC236}">
+                <a16:creationId xmlns:a16="http://schemas.microsoft.com/office/drawing/2014/main" id="{9DC76EBE-FB9D-4054-B5D8-19E3EAFE40B2}"/>
+              </a:ext>
+              <a:ext uri="{C183D7F6-B498-43B3-948B-1728B52AA6E4}">
+                <adec:decorative xmlns:adec="http://schemas.microsoft.com/office/drawing/2017/decorative" val="1"/>
+              </a:ext>
+            </a:extLst>
+          </p:cNvPr>
+          <p:cNvCxnSpPr>
+            <a:cxnSpLocks noGrp="1" noRot="1" noChangeAspect="1" noMove="1" noResize="1" noEditPoints="1" noAdjustHandles="1" noChangeArrowheads="1" noChangeShapeType="1"/>
+          </p:cNvCxnSpPr>
+          <p:nvPr>
+            <p:extLst>
+              <p:ext uri="{386F3935-93C4-4BCD-93E2-E3B085C9AB24}">
+                <p16:designElem xmlns:p16="http://schemas.microsoft.com/office/powerpoint/2015/main" val="1"/>
+              </p:ext>
+            </p:extLst>
+          </p:nvPr>
+        </p:nvCxnSpPr>
+        <p:spPr>
+          <a:xfrm>
+            <a:off x="482600" y="6368138"/>
+            <a:ext cx="11147071" cy="0"/>
+          </a:xfrm>
+          <a:prstGeom prst="line">
+            <a:avLst/>
+          </a:prstGeom>
+          <a:ln w="28575">
+            <a:solidFill>
+              <a:schemeClr val="tx2"/>
+            </a:solidFill>
+          </a:ln>
+        </p:spPr>
+        <p:style>
+          <a:lnRef idx="1">
+            <a:schemeClr val="dk1"/>
+          </a:lnRef>
+          <a:fillRef idx="0">
+            <a:schemeClr val="dk1"/>
+          </a:fillRef>
+          <a:effectRef idx="0">
+            <a:schemeClr val="dk1"/>
+          </a:effectRef>
+          <a:fontRef idx="minor">
+            <a:schemeClr val="tx1"/>
+          </a:fontRef>
+        </p:style>
+      </p:cxnSp>
+      <p:cxnSp>
+        <p:nvCxnSpPr>
+          <p:cNvPr id="21" name="Straight Connector 20">
+            <a:extLst>
+              <a:ext uri="{FF2B5EF4-FFF2-40B4-BE49-F238E27FC236}">
+                <a16:creationId xmlns:a16="http://schemas.microsoft.com/office/drawing/2014/main" id="{7DA568B4-06BE-42A6-A5B6-A0FC251DAE00}"/>
+              </a:ext>
+              <a:ext uri="{C183D7F6-B498-43B3-948B-1728B52AA6E4}">
+                <adec:decorative xmlns:adec="http://schemas.microsoft.com/office/drawing/2017/decorative" val="1"/>
+              </a:ext>
+            </a:extLst>
+          </p:cNvPr>
+          <p:cNvCxnSpPr>
+            <a:cxnSpLocks noGrp="1" noRot="1" noChangeAspect="1" noMove="1" noResize="1" noEditPoints="1" noAdjustHandles="1" noChangeArrowheads="1" noChangeShapeType="1"/>
+          </p:cNvCxnSpPr>
+          <p:nvPr>
+            <p:extLst>
+              <p:ext uri="{386F3935-93C4-4BCD-93E2-E3B085C9AB24}">
+                <p16:designElem xmlns:p16="http://schemas.microsoft.com/office/powerpoint/2015/main" val="1"/>
+              </p:ext>
+            </p:extLst>
+          </p:nvPr>
+        </p:nvCxnSpPr>
+        <p:spPr>
+          <a:xfrm>
+            <a:off x="482600" y="489855"/>
+            <a:ext cx="11147071" cy="0"/>
+          </a:xfrm>
+          <a:prstGeom prst="line">
+            <a:avLst/>
+          </a:prstGeom>
+          <a:ln w="28575">
+            <a:solidFill>
+              <a:schemeClr val="tx2"/>
+            </a:solidFill>
+          </a:ln>
+        </p:spPr>
+        <p:style>
+          <a:lnRef idx="1">
+            <a:schemeClr val="dk1"/>
+          </a:lnRef>
+          <a:fillRef idx="0">
+            <a:schemeClr val="dk1"/>
+          </a:fillRef>
+          <a:effectRef idx="0">
+            <a:schemeClr val="dk1"/>
+          </a:effectRef>
+          <a:fontRef idx="minor">
+            <a:schemeClr val="tx1"/>
+          </a:fontRef>
+        </p:style>
+      </p:cxnSp>
+      <p:cxnSp>
+        <p:nvCxnSpPr>
+          <p:cNvPr id="23" name="Straight Connector 22">
+            <a:extLst>
+              <a:ext uri="{FF2B5EF4-FFF2-40B4-BE49-F238E27FC236}">
+                <a16:creationId xmlns:a16="http://schemas.microsoft.com/office/drawing/2014/main" id="{ACC85BFE-0D03-41B5-87E4-5FA667FA5588}"/>
+              </a:ext>
+              <a:ext uri="{C183D7F6-B498-43B3-948B-1728B52AA6E4}">
+                <adec:decorative xmlns:adec="http://schemas.microsoft.com/office/drawing/2017/decorative" val="1"/>
+              </a:ext>
+            </a:extLst>
+          </p:cNvPr>
+          <p:cNvCxnSpPr>
+            <a:cxnSpLocks noGrp="1" noRot="1" noChangeAspect="1" noMove="1" noResize="1" noEditPoints="1" noAdjustHandles="1" noChangeArrowheads="1" noChangeShapeType="1"/>
+          </p:cNvCxnSpPr>
+          <p:nvPr>
+            <p:extLst>
+              <p:ext uri="{386F3935-93C4-4BCD-93E2-E3B085C9AB24}">
+                <p16:designElem xmlns:p16="http://schemas.microsoft.com/office/powerpoint/2015/main" val="1"/>
+              </p:ext>
+            </p:extLst>
+          </p:nvPr>
+        </p:nvCxnSpPr>
+        <p:spPr>
+          <a:xfrm>
+            <a:off x="482600" y="6368138"/>
+            <a:ext cx="11147071" cy="0"/>
+          </a:xfrm>
+          <a:prstGeom prst="line">
+            <a:avLst/>
+          </a:prstGeom>
+          <a:ln w="28575">
+            <a:solidFill>
+              <a:schemeClr val="tx2"/>
+            </a:solidFill>
+          </a:ln>
+        </p:spPr>
+        <p:style>
+          <a:lnRef idx="1">
+            <a:schemeClr val="dk1"/>
+          </a:lnRef>
+          <a:fillRef idx="0">
+            <a:schemeClr val="dk1"/>
+          </a:fillRef>
+          <a:effectRef idx="0">
+            <a:schemeClr val="dk1"/>
+          </a:effectRef>
+          <a:fontRef idx="minor">
+            <a:schemeClr val="tx1"/>
+          </a:fontRef>
+        </p:style>
+      </p:cxnSp>
+      <p:sp useBgFill="1">
+        <p:nvSpPr>
+          <p:cNvPr id="25" name="Rectangle 24">
+            <a:extLst>
+              <a:ext uri="{FF2B5EF4-FFF2-40B4-BE49-F238E27FC236}">
+                <a16:creationId xmlns:a16="http://schemas.microsoft.com/office/drawing/2014/main" id="{92B0CFF1-78D7-4A83-A95E-71F9E3831622}"/>
+              </a:ext>
+              <a:ext uri="{C183D7F6-B498-43B3-948B-1728B52AA6E4}">
+                <adec:decorative xmlns:adec="http://schemas.microsoft.com/office/drawing/2017/decorative" val="1"/>
+              </a:ext>
+            </a:extLst>
+          </p:cNvPr>
+          <p:cNvSpPr>
+            <a:spLocks noGrp="1" noRot="1" noChangeAspect="1" noMove="1" noResize="1" noEditPoints="1" noAdjustHandles="1" noChangeArrowheads="1" noChangeShapeType="1" noTextEdit="1"/>
+          </p:cNvSpPr>
+          <p:nvPr>
+            <p:extLst>
+              <p:ext uri="{386F3935-93C4-4BCD-93E2-E3B085C9AB24}">
+                <p16:designElem xmlns:p16="http://schemas.microsoft.com/office/powerpoint/2015/main" val="1"/>
+              </p:ext>
+            </p:extLst>
+          </p:nvPr>
+        </p:nvSpPr>
+        <p:spPr>
+          <a:xfrm>
+            <a:off x="0" y="0"/>
+            <a:ext cx="12192000" cy="6858001"/>
+          </a:xfrm>
+          <a:prstGeom prst="rect">
+            <a:avLst/>
+          </a:prstGeom>
+          <a:ln>
+            <a:noFill/>
+          </a:ln>
+        </p:spPr>
+        <p:style>
+          <a:lnRef idx="2">
+            <a:schemeClr val="accent1">
+              <a:shade val="50000"/>
+            </a:schemeClr>
+          </a:lnRef>
+          <a:fillRef idx="1">
+            <a:schemeClr val="accent1"/>
+          </a:fillRef>
+          <a:effectRef idx="0">
+            <a:schemeClr val="accent1"/>
+          </a:effectRef>
+          <a:fontRef idx="minor">
+            <a:schemeClr val="lt1"/>
+          </a:fontRef>
+        </p:style>
+        <p:txBody>
+          <a:bodyPr rtlCol="0" anchor="ctr"/>
+          <a:lstStyle/>
+          <a:p>
+            <a:pPr algn="ctr"/>
+            <a:endParaRPr lang="en-US" dirty="0"/>
+          </a:p>
+        </p:txBody>
+      </p:sp>
+      <p:cxnSp>
+        <p:nvCxnSpPr>
+          <p:cNvPr id="27" name="Straight Connector 26">
+            <a:extLst>
+              <a:ext uri="{FF2B5EF4-FFF2-40B4-BE49-F238E27FC236}">
+                <a16:creationId xmlns:a16="http://schemas.microsoft.com/office/drawing/2014/main" id="{6108BD3D-CFD0-4A15-ACF6-EBC254CD7CF1}"/>
+              </a:ext>
+              <a:ext uri="{C183D7F6-B498-43B3-948B-1728B52AA6E4}">
+                <adec:decorative xmlns:adec="http://schemas.microsoft.com/office/drawing/2017/decorative" val="1"/>
+              </a:ext>
+            </a:extLst>
+          </p:cNvPr>
+          <p:cNvCxnSpPr>
+            <a:cxnSpLocks noGrp="1" noRot="1" noChangeAspect="1" noMove="1" noResize="1" noEditPoints="1" noAdjustHandles="1" noChangeArrowheads="1" noChangeShapeType="1"/>
+          </p:cNvCxnSpPr>
+          <p:nvPr>
+            <p:extLst>
+              <p:ext uri="{386F3935-93C4-4BCD-93E2-E3B085C9AB24}">
+                <p16:designElem xmlns:p16="http://schemas.microsoft.com/office/powerpoint/2015/main" val="1"/>
+              </p:ext>
+            </p:extLst>
+          </p:nvPr>
+        </p:nvCxnSpPr>
+        <p:spPr>
+          <a:xfrm>
+            <a:off x="482600" y="489855"/>
+            <a:ext cx="11147071" cy="0"/>
+          </a:xfrm>
+          <a:prstGeom prst="line">
+            <a:avLst/>
+          </a:prstGeom>
+          <a:ln w="28575">
+            <a:solidFill>
+              <a:schemeClr val="tx2"/>
+            </a:solidFill>
+          </a:ln>
+        </p:spPr>
+        <p:style>
+          <a:lnRef idx="1">
+            <a:schemeClr val="dk1"/>
+          </a:lnRef>
+          <a:fillRef idx="0">
+            <a:schemeClr val="dk1"/>
+          </a:fillRef>
+          <a:effectRef idx="0">
+            <a:schemeClr val="dk1"/>
+          </a:effectRef>
+          <a:fontRef idx="minor">
+            <a:schemeClr val="tx1"/>
+          </a:fontRef>
+        </p:style>
+      </p:cxnSp>
+      <p:cxnSp>
+        <p:nvCxnSpPr>
+          <p:cNvPr id="29" name="Straight Connector 28">
+            <a:extLst>
+              <a:ext uri="{FF2B5EF4-FFF2-40B4-BE49-F238E27FC236}">
+                <a16:creationId xmlns:a16="http://schemas.microsoft.com/office/drawing/2014/main" id="{DB2019E5-6C31-4640-A135-6BBA7FFCF694}"/>
+              </a:ext>
+              <a:ext uri="{C183D7F6-B498-43B3-948B-1728B52AA6E4}">
+                <adec:decorative xmlns:adec="http://schemas.microsoft.com/office/drawing/2017/decorative" val="1"/>
+              </a:ext>
+            </a:extLst>
+          </p:cNvPr>
+          <p:cNvCxnSpPr>
+            <a:cxnSpLocks noGrp="1" noRot="1" noChangeAspect="1" noMove="1" noResize="1" noEditPoints="1" noAdjustHandles="1" noChangeArrowheads="1" noChangeShapeType="1"/>
+          </p:cNvCxnSpPr>
+          <p:nvPr>
+            <p:extLst>
+              <p:ext uri="{386F3935-93C4-4BCD-93E2-E3B085C9AB24}">
+                <p16:designElem xmlns:p16="http://schemas.microsoft.com/office/powerpoint/2015/main" val="1"/>
+              </p:ext>
+            </p:extLst>
+          </p:nvPr>
+        </p:nvCxnSpPr>
+        <p:spPr>
+          <a:xfrm>
+            <a:off x="482600" y="6368138"/>
+            <a:ext cx="11147071" cy="0"/>
+          </a:xfrm>
+          <a:prstGeom prst="line">
+            <a:avLst/>
+          </a:prstGeom>
+          <a:ln w="28575">
+            <a:solidFill>
+              <a:schemeClr val="tx2"/>
+            </a:solidFill>
+          </a:ln>
+        </p:spPr>
+        <p:style>
+          <a:lnRef idx="1">
+            <a:schemeClr val="dk1"/>
+          </a:lnRef>
+          <a:fillRef idx="0">
+            <a:schemeClr val="dk1"/>
+          </a:fillRef>
+          <a:effectRef idx="0">
+            <a:schemeClr val="dk1"/>
+          </a:effectRef>
+          <a:fontRef idx="minor">
+            <a:schemeClr val="tx1"/>
+          </a:fontRef>
+        </p:style>
+      </p:cxnSp>
       <p:sp>
         <p:nvSpPr>
-          <p:cNvPr id="5" name="TextBox 4">
+          <p:cNvPr id="10" name="Title 1">
             <a:extLst>
               <a:ext uri="{FF2B5EF4-FFF2-40B4-BE49-F238E27FC236}">
-                <a16:creationId xmlns:a16="http://schemas.microsoft.com/office/drawing/2014/main" id="{1AF10CC2-7967-9B44-A222-6896FA1E60F1}"/>
+                <a16:creationId xmlns:a16="http://schemas.microsoft.com/office/drawing/2014/main" id="{3A70522E-8AF8-6A4F-8657-48DA4CC4A164}"/>
               </a:ext>
             </a:extLst>
           </p:cNvPr>
-          <p:cNvSpPr txBox="1"/>
+          <p:cNvSpPr txBox="1">
+            <a:spLocks/>
+          </p:cNvSpPr>
           <p:nvPr/>
         </p:nvSpPr>
         <p:spPr>
           <a:xfrm>
-            <a:off x="408878" y="669074"/>
-            <a:ext cx="9969190" cy="369332"/>
+            <a:off x="400432" y="738663"/>
+            <a:ext cx="8661400" cy="774192"/>
           </a:xfrm>
           <a:prstGeom prst="rect">
             <a:avLst/>
           </a:prstGeom>
-          <a:noFill/>
         </p:spPr>
         <p:txBody>
-          <a:bodyPr wrap="square" rtlCol="0">
-            <a:spAutoFit/>
+          <a:bodyPr vert="horz" lIns="91440" tIns="45720" rIns="91440" bIns="45720" rtlCol="0" anchor="b">
+            <a:noAutofit/>
           </a:bodyPr>
-          <a:lstStyle/>
-          <a:p>
-            <a:r>
-              <a:rPr lang="en-IN" b="1" dirty="0"/>
-              <a:t>Scenarios</a:t>
-            </a:r>
-            <a:r>
-              <a:rPr lang="en-IN" dirty="0"/>
-              <a:t> </a:t>
-            </a:r>
-          </a:p>
-        </p:txBody>
-      </p:sp>
-      <p:sp>
-        <p:nvSpPr>
-          <p:cNvPr id="6" name="TextBox 5">
-            <a:extLst>
-              <a:ext uri="{FF2B5EF4-FFF2-40B4-BE49-F238E27FC236}">
-                <a16:creationId xmlns:a16="http://schemas.microsoft.com/office/drawing/2014/main" id="{22E596F1-2D56-3D4B-9F13-F8AF4F37BA75}"/>
-              </a:ext>
-            </a:extLst>
-          </p:cNvPr>
-          <p:cNvSpPr txBox="1"/>
-          <p:nvPr/>
-        </p:nvSpPr>
-        <p:spPr>
-          <a:xfrm>
-            <a:off x="408878" y="1196124"/>
-            <a:ext cx="11243372" cy="2739211"/>
-          </a:xfrm>
-          <a:prstGeom prst="rect">
-            <a:avLst/>
-          </a:prstGeom>
-          <a:noFill/>
-        </p:spPr>
-        <p:txBody>
-          <a:bodyPr wrap="square" rtlCol="0">
-            <a:spAutoFit/>
-          </a:bodyPr>
-          <a:lstStyle/>
-          <a:p>
-            <a:pPr marL="285750" indent="-285750">
-              <a:buFont typeface="Arial" panose="020B0604020202020204" pitchFamily="34" charset="0"/>
-              <a:buChar char="•"/>
-            </a:pPr>
-            <a:r>
-              <a:rPr lang="en-IN" sz="1600" dirty="0"/>
-              <a:t>Is my system healthy?</a:t>
-            </a:r>
-          </a:p>
-          <a:p>
-            <a:pPr lvl="1"/>
-            <a:r>
-              <a:rPr lang="en-IN" sz="1200" dirty="0"/>
-              <a:t>Get the alert in a given time duration</a:t>
-            </a:r>
-          </a:p>
-          <a:p>
-            <a:pPr lvl="1"/>
-            <a:endParaRPr lang="en-IN" sz="1200" dirty="0"/>
-          </a:p>
-          <a:p>
-            <a:pPr marL="342900" indent="-342900">
-              <a:buFont typeface="Arial" panose="020B0604020202020204" pitchFamily="34" charset="0"/>
-              <a:buChar char="•"/>
-            </a:pPr>
-            <a:r>
-              <a:rPr lang="en-IN" sz="1600" dirty="0"/>
-              <a:t>What could have caused that alert?</a:t>
-            </a:r>
-          </a:p>
-          <a:p>
-            <a:pPr lvl="1"/>
-            <a:r>
-              <a:rPr lang="en-IN" sz="1200" dirty="0"/>
-              <a:t>Diagnose the alert - Get Correlated alerts</a:t>
-            </a:r>
-          </a:p>
-          <a:p>
-            <a:pPr lvl="1"/>
-            <a:r>
-              <a:rPr lang="en-IN" sz="1200" dirty="0"/>
-              <a:t>Provide feedback and mark an alert as “root-cause” alert</a:t>
-            </a:r>
-          </a:p>
-          <a:p>
-            <a:pPr lvl="1"/>
-            <a:endParaRPr lang="en-IN" sz="1200" dirty="0"/>
-          </a:p>
-          <a:p>
-            <a:pPr marL="342900" indent="-342900">
-              <a:buFont typeface="Arial" panose="020B0604020202020204" pitchFamily="34" charset="0"/>
-              <a:buChar char="•"/>
-            </a:pPr>
-            <a:r>
-              <a:rPr lang="en-IN" sz="1600" dirty="0"/>
-              <a:t>Get Impacted Devices due to that</a:t>
-            </a:r>
-          </a:p>
-          <a:p>
-            <a:pPr marL="342900" indent="-342900">
-              <a:buFont typeface="Arial" panose="020B0604020202020204" pitchFamily="34" charset="0"/>
-              <a:buChar char="•"/>
-            </a:pPr>
-            <a:endParaRPr lang="en-IN" sz="1600" dirty="0"/>
-          </a:p>
-          <a:p>
-            <a:pPr marL="342900" indent="-342900">
-              <a:buFont typeface="Arial" panose="020B0604020202020204" pitchFamily="34" charset="0"/>
-              <a:buChar char="•"/>
-            </a:pPr>
-            <a:r>
-              <a:rPr lang="en-IN" sz="1600" dirty="0"/>
-              <a:t>What are the Unhealthy services</a:t>
+          <a:lstStyle>
+            <a:lvl1pPr algn="l" defTabSz="914400" rtl="0" eaLnBrk="1" latinLnBrk="0" hangingPunct="1">
+              <a:lnSpc>
+                <a:spcPct val="100000"/>
+              </a:lnSpc>
+              <a:spcBef>
+                <a:spcPct val="0"/>
+              </a:spcBef>
+              <a:buNone/>
+              <a:defRPr sz="6600" kern="1200">
+                <a:solidFill>
+                  <a:schemeClr val="tx1"/>
+                </a:solidFill>
+                <a:latin typeface="+mj-lt"/>
+                <a:ea typeface="+mj-ea"/>
+                <a:cs typeface="+mj-cs"/>
+              </a:defRPr>
+            </a:lvl1pPr>
+          </a:lstStyle>
+          <a:p>
+            <a:r>
+              <a:rPr lang="en-IN" sz="2800" b="1" dirty="0"/>
+              <a:t>Neo4jAlert library</a:t>
             </a:r>
             <a:br>
-              <a:rPr lang="en-IN" sz="1600" dirty="0"/>
+              <a:rPr lang="en-US" sz="2800" b="1" dirty="0"/>
             </a:br>
-            <a:br>
-              <a:rPr lang="en-IN" sz="1600" dirty="0"/>
-            </a:br>
-            <a:r>
-              <a:rPr lang="en-IN" sz="1600" dirty="0">
-                <a:solidFill>
-                  <a:srgbClr val="FF0000"/>
-                </a:solidFill>
-              </a:rPr>
-              <a:t>&lt;TODO&gt; add queries </a:t>
-            </a:r>
+            <a:endParaRPr lang="en-US" sz="2800" dirty="0"/>
           </a:p>
         </p:txBody>
       </p:sp>
     </p:spTree>
     <p:extLst>
       <p:ext uri="{BB962C8B-B14F-4D97-AF65-F5344CB8AC3E}">
-        <p14:creationId xmlns:p14="http://schemas.microsoft.com/office/powerpoint/2010/main" val="3471218948"/>
+        <p14:creationId xmlns:p14="http://schemas.microsoft.com/office/powerpoint/2010/main" val="3824427401"/>
       </p:ext>
     </p:extLst>
   </p:cSld>
@@ -4588,7 +4870,7 @@
         <p:spPr>
           <a:xfrm>
             <a:off x="408878" y="669074"/>
-            <a:ext cx="9969190" cy="369332"/>
+            <a:ext cx="9969190" cy="523220"/>
           </a:xfrm>
           <a:prstGeom prst="rect">
             <a:avLst/>
@@ -4602,7 +4884,2057 @@
           <a:lstStyle/>
           <a:p>
             <a:r>
-              <a:rPr lang="en-IN" b="1" dirty="0"/>
+              <a:rPr lang="en-IN" sz="2800" b="1" dirty="0"/>
+              <a:t>Scenarios</a:t>
+            </a:r>
+            <a:r>
+              <a:rPr lang="en-IN" dirty="0"/>
+              <a:t> </a:t>
+            </a:r>
+          </a:p>
+        </p:txBody>
+      </p:sp>
+      <p:sp>
+        <p:nvSpPr>
+          <p:cNvPr id="6" name="TextBox 5">
+            <a:extLst>
+              <a:ext uri="{FF2B5EF4-FFF2-40B4-BE49-F238E27FC236}">
+                <a16:creationId xmlns:a16="http://schemas.microsoft.com/office/drawing/2014/main" id="{22E596F1-2D56-3D4B-9F13-F8AF4F37BA75}"/>
+              </a:ext>
+            </a:extLst>
+          </p:cNvPr>
+          <p:cNvSpPr txBox="1"/>
+          <p:nvPr/>
+        </p:nvSpPr>
+        <p:spPr>
+          <a:xfrm>
+            <a:off x="408878" y="1099367"/>
+            <a:ext cx="11243372" cy="6309420"/>
+          </a:xfrm>
+          <a:prstGeom prst="rect">
+            <a:avLst/>
+          </a:prstGeom>
+          <a:noFill/>
+        </p:spPr>
+        <p:txBody>
+          <a:bodyPr wrap="square" rtlCol="0">
+            <a:spAutoFit/>
+          </a:bodyPr>
+          <a:lstStyle/>
+          <a:p>
+            <a:pPr marL="285750" indent="-285750">
+              <a:buFont typeface="Arial" panose="020B0604020202020204" pitchFamily="34" charset="0"/>
+              <a:buChar char="•"/>
+            </a:pPr>
+            <a:r>
+              <a:rPr lang="en-IN" sz="1600" b="1" dirty="0"/>
+              <a:t>Is my system healthy?</a:t>
+            </a:r>
+          </a:p>
+          <a:p>
+            <a:pPr lvl="1"/>
+            <a:r>
+              <a:rPr lang="en-IN" sz="1400" b="1" dirty="0"/>
+              <a:t>What are the alerts counts in a given time duration?</a:t>
+            </a:r>
+          </a:p>
+          <a:p>
+            <a:pPr lvl="1"/>
+            <a:r>
+              <a:rPr lang="en-IN" sz="1000" b="1" dirty="0"/>
+              <a:t>Cypher Query: </a:t>
+            </a:r>
+          </a:p>
+          <a:p>
+            <a:pPr lvl="1"/>
+            <a:r>
+              <a:rPr lang="en-US" sz="1000" i="1" dirty="0"/>
+              <a:t>MATCH(</a:t>
+            </a:r>
+            <a:r>
+              <a:rPr lang="en-US" sz="1000" i="1" dirty="0" err="1"/>
+              <a:t>i:Interval</a:t>
+            </a:r>
+            <a:r>
+              <a:rPr lang="en-US" sz="1000" i="1" dirty="0"/>
+              <a:t>)-[r]-(</a:t>
+            </a:r>
+            <a:r>
+              <a:rPr lang="en-US" sz="1000" i="1" dirty="0" err="1"/>
+              <a:t>a:Alert</a:t>
+            </a:r>
+            <a:r>
+              <a:rPr lang="en-US" sz="1000" i="1" dirty="0"/>
+              <a:t>) WHERE   </a:t>
+            </a:r>
+            <a:r>
+              <a:rPr lang="en-US" sz="1000" i="1" dirty="0" err="1"/>
+              <a:t>i.date</a:t>
+            </a:r>
+            <a:r>
+              <a:rPr lang="en-US" sz="1000" i="1" dirty="0"/>
+              <a:t> &gt;= '11-23-2021' AND </a:t>
+            </a:r>
+            <a:r>
+              <a:rPr lang="en-US" sz="1000" i="1" dirty="0" err="1"/>
+              <a:t>i.startTime</a:t>
+            </a:r>
+            <a:r>
+              <a:rPr lang="en-US" sz="1000" i="1" dirty="0"/>
+              <a:t> &gt;= '17:00' AND </a:t>
+            </a:r>
+            <a:r>
+              <a:rPr lang="en-US" sz="1000" i="1" dirty="0" err="1"/>
+              <a:t>i.date</a:t>
+            </a:r>
+            <a:r>
+              <a:rPr lang="en-US" sz="1000" i="1" dirty="0"/>
+              <a:t> &lt;= '11-23-2021' AND </a:t>
+            </a:r>
+            <a:r>
+              <a:rPr lang="en-US" sz="1000" i="1" dirty="0" err="1"/>
+              <a:t>i.endTime</a:t>
+            </a:r>
+            <a:r>
+              <a:rPr lang="en-US" sz="1000" i="1" dirty="0"/>
+              <a:t> &lt;= '23:00’  return  count(a) as </a:t>
+            </a:r>
+            <a:r>
+              <a:rPr lang="en-US" sz="1000" i="1" dirty="0" err="1"/>
+              <a:t>cnt</a:t>
+            </a:r>
+            <a:endParaRPr lang="en-US" sz="1000" i="1" dirty="0"/>
+          </a:p>
+          <a:p>
+            <a:pPr lvl="1"/>
+            <a:endParaRPr lang="en-IN" sz="1600" dirty="0"/>
+          </a:p>
+          <a:p>
+            <a:pPr marL="342900" indent="-342900">
+              <a:buFont typeface="Arial" panose="020B0604020202020204" pitchFamily="34" charset="0"/>
+              <a:buChar char="•"/>
+            </a:pPr>
+            <a:r>
+              <a:rPr lang="en-IN" sz="1600" b="1" dirty="0"/>
+              <a:t>What could have caused the alert?</a:t>
+            </a:r>
+          </a:p>
+          <a:p>
+            <a:pPr lvl="1"/>
+            <a:r>
+              <a:rPr lang="en-IN" sz="1400" b="1" dirty="0"/>
+              <a:t>Diagnose the alert - get the top 5 correlated alerts</a:t>
+            </a:r>
+          </a:p>
+          <a:p>
+            <a:pPr lvl="1"/>
+            <a:r>
+              <a:rPr lang="en-IN" sz="1000" b="1" dirty="0"/>
+              <a:t>Cypher Query: </a:t>
+            </a:r>
+          </a:p>
+          <a:p>
+            <a:pPr lvl="1"/>
+            <a:r>
+              <a:rPr lang="en-US" sz="1000" i="1" dirty="0"/>
+              <a:t>MATCH (</a:t>
+            </a:r>
+            <a:r>
+              <a:rPr lang="en-US" sz="1000" i="1" dirty="0" err="1"/>
+              <a:t>n:Alert</a:t>
+            </a:r>
+            <a:r>
+              <a:rPr lang="en-US" sz="1000" i="1" dirty="0"/>
+              <a:t> ) WHERE  </a:t>
+            </a:r>
+            <a:r>
+              <a:rPr lang="en-US" sz="1000" i="1" dirty="0" err="1"/>
+              <a:t>toLower</a:t>
+            </a:r>
+            <a:r>
+              <a:rPr lang="en-US" sz="1000" i="1" dirty="0"/>
+              <a:t>(</a:t>
+            </a:r>
+            <a:r>
+              <a:rPr lang="en-US" sz="1000" i="1" dirty="0" err="1"/>
+              <a:t>n.ci</a:t>
+            </a:r>
+            <a:r>
+              <a:rPr lang="en-US" sz="1000" i="1" dirty="0"/>
+              <a:t>)=</a:t>
+            </a:r>
+            <a:r>
+              <a:rPr lang="en-US" sz="1000" i="1" dirty="0" err="1"/>
+              <a:t>toLower</a:t>
+            </a:r>
+            <a:r>
+              <a:rPr lang="en-US" sz="1000" i="1" dirty="0"/>
+              <a:t>('bld-med-bca-05.ihl.broadcom.net’) </a:t>
+            </a:r>
+          </a:p>
+          <a:p>
+            <a:pPr lvl="1"/>
+            <a:r>
+              <a:rPr lang="en-US" sz="1000" i="1" dirty="0"/>
+              <a:t>AND </a:t>
+            </a:r>
+            <a:r>
+              <a:rPr lang="en-US" sz="1000" i="1" dirty="0" err="1"/>
+              <a:t>toLower</a:t>
+            </a:r>
+            <a:r>
+              <a:rPr lang="en-US" sz="1000" i="1" dirty="0"/>
+              <a:t>(</a:t>
+            </a:r>
+            <a:r>
+              <a:rPr lang="en-US" sz="1000" i="1" dirty="0" err="1"/>
+              <a:t>n.name</a:t>
+            </a:r>
+            <a:r>
+              <a:rPr lang="en-US" sz="1000" i="1" dirty="0"/>
+              <a:t>) CONTAINS </a:t>
+            </a:r>
+            <a:r>
+              <a:rPr lang="en-US" sz="1000" i="1" dirty="0" err="1"/>
+              <a:t>toLower</a:t>
+            </a:r>
+            <a:r>
+              <a:rPr lang="en-US" sz="1000" i="1" dirty="0"/>
+              <a:t>('Interface is down')</a:t>
+            </a:r>
+          </a:p>
+          <a:p>
+            <a:pPr lvl="1"/>
+            <a:r>
+              <a:rPr lang="en-US" sz="1000" i="1" dirty="0"/>
+              <a:t> CALL { WITH n MATCH (n)-[</a:t>
+            </a:r>
+            <a:r>
+              <a:rPr lang="en-US" sz="1000" i="1" dirty="0" err="1"/>
+              <a:t>r:CORRELATED_AT</a:t>
+            </a:r>
+            <a:r>
+              <a:rPr lang="en-US" sz="1000" i="1" dirty="0"/>
+              <a:t>]-(</a:t>
+            </a:r>
+            <a:r>
+              <a:rPr lang="en-US" sz="1000" i="1" dirty="0" err="1"/>
+              <a:t>asso_alert</a:t>
+            </a:r>
+            <a:r>
+              <a:rPr lang="en-US" sz="1000" i="1" dirty="0"/>
+              <a:t>) </a:t>
+            </a:r>
+          </a:p>
+          <a:p>
+            <a:pPr lvl="2"/>
+            <a:r>
+              <a:rPr lang="en-US" sz="1000" i="1" dirty="0"/>
+              <a:t>RETURN </a:t>
+            </a:r>
+            <a:r>
+              <a:rPr lang="en-US" sz="1000" i="1" dirty="0" err="1"/>
+              <a:t>asso_alert</a:t>
+            </a:r>
+            <a:r>
+              <a:rPr lang="en-US" sz="1000" i="1" dirty="0"/>
+              <a:t>,(n)-[</a:t>
+            </a:r>
+            <a:r>
+              <a:rPr lang="en-US" sz="1000" i="1" dirty="0" err="1"/>
+              <a:t>r:CORRELATED_AT</a:t>
+            </a:r>
+            <a:r>
+              <a:rPr lang="en-US" sz="1000" i="1" dirty="0"/>
+              <a:t>]-(</a:t>
+            </a:r>
+            <a:r>
+              <a:rPr lang="en-US" sz="1000" i="1" dirty="0" err="1"/>
+              <a:t>asso_alert</a:t>
+            </a:r>
+            <a:r>
+              <a:rPr lang="en-US" sz="1000" i="1" dirty="0"/>
+              <a:t>) as relation</a:t>
+            </a:r>
+          </a:p>
+          <a:p>
+            <a:pPr lvl="2"/>
+            <a:r>
+              <a:rPr lang="en-US" sz="1000" i="1" dirty="0"/>
+              <a:t>ORDER BY </a:t>
+            </a:r>
+            <a:r>
+              <a:rPr lang="en-US" sz="1000" i="1" dirty="0" err="1"/>
+              <a:t>r.mutual_information</a:t>
+            </a:r>
+            <a:r>
+              <a:rPr lang="en-US" sz="1000" i="1" dirty="0"/>
+              <a:t> DESC.    }</a:t>
+            </a:r>
+          </a:p>
+          <a:p>
+            <a:pPr lvl="1"/>
+            <a:r>
+              <a:rPr lang="en-US" sz="1000" i="1" dirty="0"/>
+              <a:t> RETURN </a:t>
+            </a:r>
+            <a:r>
+              <a:rPr lang="en-US" sz="1000" i="1" dirty="0" err="1"/>
+              <a:t>asso_alert</a:t>
+            </a:r>
+            <a:r>
+              <a:rPr lang="en-US" sz="1000" i="1" dirty="0"/>
+              <a:t> as vertex, relation as edge LIMIT 5</a:t>
+            </a:r>
+          </a:p>
+          <a:p>
+            <a:pPr lvl="1"/>
+            <a:endParaRPr lang="en-IN" sz="1600" dirty="0"/>
+          </a:p>
+          <a:p>
+            <a:pPr lvl="1"/>
+            <a:r>
+              <a:rPr lang="en-IN" sz="1400" b="1" dirty="0"/>
+              <a:t>Provide feedback and mark an alert as “root-cause” alert</a:t>
+            </a:r>
+          </a:p>
+          <a:p>
+            <a:pPr lvl="1"/>
+            <a:r>
+              <a:rPr lang="en-IN" sz="1000" b="1" dirty="0"/>
+              <a:t>Cypher Query: </a:t>
+            </a:r>
+          </a:p>
+          <a:p>
+            <a:pPr lvl="1"/>
+            <a:r>
+              <a:rPr lang="en-US" sz="1000" i="1" dirty="0"/>
+              <a:t>MATCH (</a:t>
+            </a:r>
+            <a:r>
+              <a:rPr lang="en-US" sz="1000" i="1" dirty="0" err="1"/>
+              <a:t>n:Alert</a:t>
+            </a:r>
+            <a:r>
+              <a:rPr lang="en-US" sz="1000" i="1" dirty="0"/>
+              <a:t> ) WHERE  </a:t>
+            </a:r>
+            <a:r>
+              <a:rPr lang="en-US" sz="1000" i="1" dirty="0" err="1"/>
+              <a:t>toLower</a:t>
+            </a:r>
+            <a:r>
+              <a:rPr lang="en-US" sz="1000" i="1" dirty="0"/>
+              <a:t>(</a:t>
+            </a:r>
+            <a:r>
+              <a:rPr lang="en-US" sz="1000" i="1" dirty="0" err="1"/>
+              <a:t>n.name</a:t>
+            </a:r>
+            <a:r>
+              <a:rPr lang="en-US" sz="1000" i="1" dirty="0"/>
+              <a:t>) CONTAINS </a:t>
+            </a:r>
+            <a:r>
+              <a:rPr lang="en-US" sz="1000" i="1" dirty="0" err="1"/>
+              <a:t>toLower</a:t>
+            </a:r>
+            <a:r>
+              <a:rPr lang="en-US" sz="1000" i="1" dirty="0"/>
+              <a:t>('Interface is down') </a:t>
+            </a:r>
+          </a:p>
+          <a:p>
+            <a:pPr lvl="1"/>
+            <a:r>
+              <a:rPr lang="en-US" sz="1000" i="1" dirty="0"/>
+              <a:t>MATCH (n)-[</a:t>
+            </a:r>
+            <a:r>
+              <a:rPr lang="en-US" sz="1000" i="1" dirty="0" err="1"/>
+              <a:t>r:CORRELATED_AT</a:t>
+            </a:r>
+            <a:r>
+              <a:rPr lang="en-US" sz="1000" i="1" dirty="0"/>
+              <a:t>]-(</a:t>
+            </a:r>
+            <a:r>
+              <a:rPr lang="en-US" sz="1000" i="1" dirty="0" err="1"/>
+              <a:t>asso_alert</a:t>
+            </a:r>
+            <a:r>
+              <a:rPr lang="en-US" sz="1000" i="1" dirty="0"/>
+              <a:t>), (</a:t>
+            </a:r>
+            <a:r>
+              <a:rPr lang="en-US" sz="1000" i="1" dirty="0" err="1"/>
+              <a:t>asso_alert</a:t>
+            </a:r>
+            <a:r>
+              <a:rPr lang="en-US" sz="1000" i="1" dirty="0"/>
+              <a:t>)-[:GENERATED_AT]-(</a:t>
+            </a:r>
+            <a:r>
+              <a:rPr lang="en-US" sz="1000" i="1" dirty="0" err="1"/>
+              <a:t>i:Interval</a:t>
+            </a:r>
+            <a:r>
+              <a:rPr lang="en-US" sz="1000" i="1" dirty="0"/>
+              <a:t>) </a:t>
+            </a:r>
+          </a:p>
+          <a:p>
+            <a:pPr lvl="1"/>
+            <a:r>
+              <a:rPr lang="en-US" sz="1000" i="1" dirty="0"/>
+              <a:t>WHERE  </a:t>
+            </a:r>
+            <a:r>
+              <a:rPr lang="en-US" sz="1000" i="1" dirty="0" err="1"/>
+              <a:t>i.date</a:t>
+            </a:r>
+            <a:r>
+              <a:rPr lang="en-US" sz="1000" i="1" dirty="0"/>
+              <a:t> = '11-23-2021' AND </a:t>
+            </a:r>
+            <a:r>
+              <a:rPr lang="en-US" sz="1000" i="1" dirty="0" err="1"/>
+              <a:t>i.startTime</a:t>
+            </a:r>
+            <a:r>
+              <a:rPr lang="en-US" sz="1000" i="1" dirty="0"/>
+              <a:t> &lt;= '20:43' AND </a:t>
+            </a:r>
+            <a:r>
+              <a:rPr lang="en-US" sz="1000" i="1" dirty="0" err="1"/>
+              <a:t>i.endTime</a:t>
+            </a:r>
+            <a:r>
+              <a:rPr lang="en-US" sz="1000" i="1" dirty="0"/>
+              <a:t> &gt;= '20:43' AND  </a:t>
+            </a:r>
+            <a:r>
+              <a:rPr lang="en-US" sz="1000" i="1" dirty="0" err="1"/>
+              <a:t>toLower</a:t>
+            </a:r>
+            <a:r>
+              <a:rPr lang="en-US" sz="1000" i="1" dirty="0"/>
+              <a:t>(</a:t>
+            </a:r>
+            <a:r>
+              <a:rPr lang="en-US" sz="1000" i="1" dirty="0" err="1"/>
+              <a:t>asso_alert.name</a:t>
+            </a:r>
+            <a:r>
+              <a:rPr lang="en-US" sz="1000" i="1" dirty="0"/>
+              <a:t>) </a:t>
+            </a:r>
+          </a:p>
+          <a:p>
+            <a:pPr lvl="1"/>
+            <a:r>
+              <a:rPr lang="en-US" sz="1000" i="1" dirty="0"/>
+              <a:t>CONTAINS </a:t>
+            </a:r>
+            <a:r>
+              <a:rPr lang="en-US" sz="1000" i="1" dirty="0" err="1"/>
+              <a:t>toLower</a:t>
+            </a:r>
+            <a:r>
+              <a:rPr lang="en-US" sz="1000" i="1" dirty="0"/>
+              <a:t>('MANAGEMENT AGENT LOST') </a:t>
+            </a:r>
+          </a:p>
+          <a:p>
+            <a:pPr lvl="1"/>
+            <a:r>
+              <a:rPr lang="en-US" sz="1000" i="1" dirty="0"/>
+              <a:t>MERGE (</a:t>
+            </a:r>
+            <a:r>
+              <a:rPr lang="en-US" sz="1000" i="1" dirty="0" err="1"/>
+              <a:t>asso_alert</a:t>
+            </a:r>
+            <a:r>
+              <a:rPr lang="en-US" sz="1000" i="1" dirty="0"/>
+              <a:t>)-[</a:t>
+            </a:r>
+            <a:r>
+              <a:rPr lang="en-US" sz="1000" i="1" dirty="0" err="1"/>
+              <a:t>g:GENERATED_AT</a:t>
+            </a:r>
+            <a:r>
+              <a:rPr lang="en-US" sz="1000" i="1" dirty="0"/>
+              <a:t>]-(</a:t>
+            </a:r>
+            <a:r>
+              <a:rPr lang="en-US" sz="1000" i="1" dirty="0" err="1"/>
+              <a:t>i</a:t>
+            </a:r>
+            <a:r>
+              <a:rPr lang="en-US" sz="1000" i="1" dirty="0"/>
+              <a:t>) </a:t>
+            </a:r>
+          </a:p>
+          <a:p>
+            <a:pPr lvl="1"/>
+            <a:r>
+              <a:rPr lang="en-US" sz="1000" i="1" dirty="0"/>
+              <a:t>ON MATCH SET </a:t>
+            </a:r>
+            <a:r>
+              <a:rPr lang="en-US" sz="1000" i="1" dirty="0" err="1"/>
+              <a:t>g.root_cause</a:t>
+            </a:r>
+            <a:r>
+              <a:rPr lang="en-US" sz="1000" i="1" dirty="0"/>
+              <a:t>=true</a:t>
+            </a:r>
+            <a:br>
+              <a:rPr lang="en-US" sz="1000" i="1" dirty="0"/>
+            </a:br>
+            <a:endParaRPr lang="en-US" sz="1000" i="1" dirty="0"/>
+          </a:p>
+          <a:p>
+            <a:pPr marL="285750" indent="-285750">
+              <a:buFont typeface="Arial" panose="020B0604020202020204" pitchFamily="34" charset="0"/>
+              <a:buChar char="•"/>
+            </a:pPr>
+            <a:r>
+              <a:rPr lang="en-IN" sz="1600" b="1" dirty="0"/>
+              <a:t>What are the “root-cause” alerts ?</a:t>
+            </a:r>
+            <a:br>
+              <a:rPr lang="en-IN" sz="1600" dirty="0"/>
+            </a:br>
+            <a:r>
+              <a:rPr lang="en-IN" sz="1000" b="1" dirty="0"/>
+              <a:t>Cypher Query: </a:t>
+            </a:r>
+          </a:p>
+          <a:p>
+            <a:pPr lvl="1"/>
+            <a:r>
+              <a:rPr lang="en-US" sz="1200" i="1" dirty="0"/>
+              <a:t>MATCH (</a:t>
+            </a:r>
+            <a:r>
+              <a:rPr lang="en-US" sz="1200" i="1" dirty="0" err="1"/>
+              <a:t>asso_alert</a:t>
+            </a:r>
+            <a:r>
+              <a:rPr lang="en-US" sz="1200" i="1" dirty="0"/>
+              <a:t>)-[</a:t>
+            </a:r>
+            <a:r>
+              <a:rPr lang="en-US" sz="1200" i="1" dirty="0" err="1"/>
+              <a:t>g:GENERATED_AT</a:t>
+            </a:r>
+            <a:r>
+              <a:rPr lang="en-US" sz="1200" i="1" dirty="0"/>
+              <a:t>]-(</a:t>
+            </a:r>
+            <a:r>
+              <a:rPr lang="en-US" sz="1200" i="1" dirty="0" err="1"/>
+              <a:t>i:Interval</a:t>
+            </a:r>
+            <a:r>
+              <a:rPr lang="en-US" sz="1200" i="1" dirty="0"/>
+              <a:t>) </a:t>
+            </a:r>
+            <a:br>
+              <a:rPr lang="en-US" sz="1200" i="1" dirty="0"/>
+            </a:br>
+            <a:r>
+              <a:rPr lang="en-US" sz="1200" i="1" dirty="0"/>
+              <a:t>WHERE </a:t>
+            </a:r>
+            <a:r>
+              <a:rPr lang="en-US" sz="1200" i="1" dirty="0" err="1"/>
+              <a:t>g.root_cause</a:t>
+            </a:r>
+            <a:r>
+              <a:rPr lang="en-US" sz="1200" i="1" dirty="0"/>
+              <a:t>=true and   </a:t>
+            </a:r>
+            <a:r>
+              <a:rPr lang="en-US" sz="1200" i="1" dirty="0" err="1"/>
+              <a:t>i.date</a:t>
+            </a:r>
+            <a:r>
+              <a:rPr lang="en-US" sz="1200" i="1" dirty="0"/>
+              <a:t> = '11-23-2021' and </a:t>
+            </a:r>
+            <a:r>
+              <a:rPr lang="en-US" sz="1200" i="1" dirty="0" err="1"/>
+              <a:t>i.startTime</a:t>
+            </a:r>
+            <a:r>
+              <a:rPr lang="en-US" sz="1200" i="1" dirty="0"/>
+              <a:t> &gt;= '16:00' and </a:t>
+            </a:r>
+            <a:r>
+              <a:rPr lang="en-US" sz="1200" i="1" dirty="0" err="1"/>
+              <a:t>i.endTime</a:t>
+            </a:r>
+            <a:r>
+              <a:rPr lang="en-US" sz="1200" i="1" dirty="0"/>
+              <a:t> &lt;= '23:00' </a:t>
+            </a:r>
+          </a:p>
+          <a:p>
+            <a:pPr lvl="1"/>
+            <a:r>
+              <a:rPr lang="en-US" sz="1200" i="1" dirty="0"/>
+              <a:t>RETURN distinct((</a:t>
+            </a:r>
+            <a:r>
+              <a:rPr lang="en-US" sz="1200" i="1" dirty="0" err="1"/>
+              <a:t>asso_alert</a:t>
+            </a:r>
+            <a:r>
+              <a:rPr lang="en-US" sz="1200" i="1" dirty="0"/>
+              <a:t>)-[</a:t>
+            </a:r>
+            <a:r>
+              <a:rPr lang="en-US" sz="1200" i="1" dirty="0" err="1"/>
+              <a:t>g:GENERATED_AT</a:t>
+            </a:r>
+            <a:r>
+              <a:rPr lang="en-US" sz="1200" i="1" dirty="0"/>
+              <a:t>]-(</a:t>
+            </a:r>
+            <a:r>
+              <a:rPr lang="en-US" sz="1200" i="1" dirty="0" err="1"/>
+              <a:t>i:Interval</a:t>
+            </a:r>
+            <a:r>
+              <a:rPr lang="en-US" sz="1200" i="1" dirty="0"/>
+              <a:t>)) </a:t>
+            </a:r>
+          </a:p>
+          <a:p>
+            <a:endParaRPr lang="en-US" sz="1000" i="1" dirty="0"/>
+          </a:p>
+          <a:p>
+            <a:br>
+              <a:rPr lang="en-IN" sz="1600" dirty="0"/>
+            </a:br>
+            <a:br>
+              <a:rPr lang="en-IN" sz="1600" dirty="0"/>
+            </a:br>
+            <a:endParaRPr lang="en-IN" sz="1600" dirty="0">
+              <a:solidFill>
+                <a:srgbClr val="FF0000"/>
+              </a:solidFill>
+            </a:endParaRPr>
+          </a:p>
+        </p:txBody>
+      </p:sp>
+      <p:pic>
+        <p:nvPicPr>
+          <p:cNvPr id="3" name="Picture 2">
+            <a:extLst>
+              <a:ext uri="{FF2B5EF4-FFF2-40B4-BE49-F238E27FC236}">
+                <a16:creationId xmlns:a16="http://schemas.microsoft.com/office/drawing/2014/main" id="{254D9DB1-1BFD-7244-8A1D-BAAD45FAB576}"/>
+              </a:ext>
+            </a:extLst>
+          </p:cNvPr>
+          <p:cNvPicPr>
+            <a:picLocks noChangeAspect="1"/>
+          </p:cNvPicPr>
+          <p:nvPr/>
+        </p:nvPicPr>
+        <p:blipFill>
+          <a:blip r:embed="rId2"/>
+          <a:stretch>
+            <a:fillRect/>
+          </a:stretch>
+        </p:blipFill>
+        <p:spPr>
+          <a:xfrm>
+            <a:off x="6576470" y="2105294"/>
+            <a:ext cx="3385852" cy="1837202"/>
+          </a:xfrm>
+          <a:prstGeom prst="rect">
+            <a:avLst/>
+          </a:prstGeom>
+        </p:spPr>
+      </p:pic>
+      <p:cxnSp>
+        <p:nvCxnSpPr>
+          <p:cNvPr id="9" name="Curved Connector 8">
+            <a:extLst>
+              <a:ext uri="{FF2B5EF4-FFF2-40B4-BE49-F238E27FC236}">
+                <a16:creationId xmlns:a16="http://schemas.microsoft.com/office/drawing/2014/main" id="{6359BB25-A27C-7647-8AB1-91AC464FAE1F}"/>
+              </a:ext>
+            </a:extLst>
+          </p:cNvPr>
+          <p:cNvCxnSpPr>
+            <a:cxnSpLocks/>
+          </p:cNvCxnSpPr>
+          <p:nvPr/>
+        </p:nvCxnSpPr>
+        <p:spPr>
+          <a:xfrm flipV="1">
+            <a:off x="5780785" y="2478795"/>
+            <a:ext cx="631032" cy="286439"/>
+          </a:xfrm>
+          <a:prstGeom prst="curvedConnector3">
+            <a:avLst/>
+          </a:prstGeom>
+          <a:ln w="34925">
+            <a:solidFill>
+              <a:schemeClr val="accent5">
+                <a:lumMod val="75000"/>
+              </a:schemeClr>
+            </a:solidFill>
+            <a:tailEnd type="triangle"/>
+          </a:ln>
+        </p:spPr>
+        <p:style>
+          <a:lnRef idx="1">
+            <a:schemeClr val="accent1"/>
+          </a:lnRef>
+          <a:fillRef idx="0">
+            <a:schemeClr val="accent1"/>
+          </a:fillRef>
+          <a:effectRef idx="0">
+            <a:schemeClr val="accent1"/>
+          </a:effectRef>
+          <a:fontRef idx="minor">
+            <a:schemeClr val="tx1"/>
+          </a:fontRef>
+        </p:style>
+      </p:cxnSp>
+      <p:pic>
+        <p:nvPicPr>
+          <p:cNvPr id="11" name="Picture 10">
+            <a:extLst>
+              <a:ext uri="{FF2B5EF4-FFF2-40B4-BE49-F238E27FC236}">
+                <a16:creationId xmlns:a16="http://schemas.microsoft.com/office/drawing/2014/main" id="{6C52E8B6-288A-954A-A56E-6257128F5E5B}"/>
+              </a:ext>
+            </a:extLst>
+          </p:cNvPr>
+          <p:cNvPicPr>
+            <a:picLocks noChangeAspect="1"/>
+          </p:cNvPicPr>
+          <p:nvPr/>
+        </p:nvPicPr>
+        <p:blipFill>
+          <a:blip r:embed="rId3"/>
+          <a:stretch>
+            <a:fillRect/>
+          </a:stretch>
+        </p:blipFill>
+        <p:spPr>
+          <a:xfrm>
+            <a:off x="7866044" y="4514904"/>
+            <a:ext cx="2812973" cy="1650668"/>
+          </a:xfrm>
+          <a:prstGeom prst="rect">
+            <a:avLst/>
+          </a:prstGeom>
+        </p:spPr>
+      </p:pic>
+      <p:cxnSp>
+        <p:nvCxnSpPr>
+          <p:cNvPr id="13" name="Curved Connector 12">
+            <a:extLst>
+              <a:ext uri="{FF2B5EF4-FFF2-40B4-BE49-F238E27FC236}">
+                <a16:creationId xmlns:a16="http://schemas.microsoft.com/office/drawing/2014/main" id="{6B150199-B984-A149-AFB9-EB5B5228F6C8}"/>
+              </a:ext>
+            </a:extLst>
+          </p:cNvPr>
+          <p:cNvCxnSpPr>
+            <a:cxnSpLocks/>
+          </p:cNvCxnSpPr>
+          <p:nvPr/>
+        </p:nvCxnSpPr>
+        <p:spPr>
+          <a:xfrm flipV="1">
+            <a:off x="6892811" y="5472194"/>
+            <a:ext cx="631032" cy="286439"/>
+          </a:xfrm>
+          <a:prstGeom prst="curvedConnector3">
+            <a:avLst/>
+          </a:prstGeom>
+          <a:ln w="34925">
+            <a:solidFill>
+              <a:schemeClr val="accent5">
+                <a:lumMod val="75000"/>
+              </a:schemeClr>
+            </a:solidFill>
+            <a:tailEnd type="triangle"/>
+          </a:ln>
+        </p:spPr>
+        <p:style>
+          <a:lnRef idx="1">
+            <a:schemeClr val="accent1"/>
+          </a:lnRef>
+          <a:fillRef idx="0">
+            <a:schemeClr val="accent1"/>
+          </a:fillRef>
+          <a:effectRef idx="0">
+            <a:schemeClr val="accent1"/>
+          </a:effectRef>
+          <a:fontRef idx="minor">
+            <a:schemeClr val="tx1"/>
+          </a:fontRef>
+        </p:style>
+      </p:cxnSp>
+    </p:spTree>
+    <p:extLst>
+      <p:ext uri="{BB962C8B-B14F-4D97-AF65-F5344CB8AC3E}">
+        <p14:creationId xmlns:p14="http://schemas.microsoft.com/office/powerpoint/2010/main" val="3471218948"/>
+      </p:ext>
+    </p:extLst>
+  </p:cSld>
+  <p:clrMapOvr>
+    <a:masterClrMapping/>
+  </p:clrMapOvr>
+</p:sld>
+</file>
+
+<file path=ppt/slides/slide12.xml><?xml version="1.0" encoding="utf-8"?>
+<p:sld xmlns:a="http://schemas.openxmlformats.org/drawingml/2006/main" xmlns:r="http://schemas.openxmlformats.org/officeDocument/2006/relationships" xmlns:p="http://schemas.openxmlformats.org/presentationml/2006/main">
+  <p:cSld>
+    <p:spTree>
+      <p:nvGrpSpPr>
+        <p:cNvPr id="1" name=""/>
+        <p:cNvGrpSpPr/>
+        <p:nvPr/>
+      </p:nvGrpSpPr>
+      <p:grpSpPr>
+        <a:xfrm>
+          <a:off x="0" y="0"/>
+          <a:ext cx="0" cy="0"/>
+          <a:chOff x="0" y="0"/>
+          <a:chExt cx="0" cy="0"/>
+        </a:xfrm>
+      </p:grpSpPr>
+      <p:sp>
+        <p:nvSpPr>
+          <p:cNvPr id="5" name="TextBox 4">
+            <a:extLst>
+              <a:ext uri="{FF2B5EF4-FFF2-40B4-BE49-F238E27FC236}">
+                <a16:creationId xmlns:a16="http://schemas.microsoft.com/office/drawing/2014/main" id="{1AF10CC2-7967-9B44-A222-6896FA1E60F1}"/>
+              </a:ext>
+            </a:extLst>
+          </p:cNvPr>
+          <p:cNvSpPr txBox="1"/>
+          <p:nvPr/>
+        </p:nvSpPr>
+        <p:spPr>
+          <a:xfrm>
+            <a:off x="408878" y="669074"/>
+            <a:ext cx="9969190" cy="523220"/>
+          </a:xfrm>
+          <a:prstGeom prst="rect">
+            <a:avLst/>
+          </a:prstGeom>
+          <a:noFill/>
+        </p:spPr>
+        <p:txBody>
+          <a:bodyPr wrap="square" rtlCol="0">
+            <a:spAutoFit/>
+          </a:bodyPr>
+          <a:lstStyle/>
+          <a:p>
+            <a:r>
+              <a:rPr lang="en-IN" sz="2800" b="1" dirty="0"/>
+              <a:t>Scenarios </a:t>
+            </a:r>
+            <a:r>
+              <a:rPr lang="en-IN" sz="2000" b="1" i="1" dirty="0"/>
+              <a:t>(continued…)</a:t>
+            </a:r>
+            <a:endParaRPr lang="en-IN" sz="2000" i="1" dirty="0"/>
+          </a:p>
+        </p:txBody>
+      </p:sp>
+      <p:sp>
+        <p:nvSpPr>
+          <p:cNvPr id="6" name="TextBox 5">
+            <a:extLst>
+              <a:ext uri="{FF2B5EF4-FFF2-40B4-BE49-F238E27FC236}">
+                <a16:creationId xmlns:a16="http://schemas.microsoft.com/office/drawing/2014/main" id="{22E596F1-2D56-3D4B-9F13-F8AF4F37BA75}"/>
+              </a:ext>
+            </a:extLst>
+          </p:cNvPr>
+          <p:cNvSpPr txBox="1"/>
+          <p:nvPr/>
+        </p:nvSpPr>
+        <p:spPr>
+          <a:xfrm>
+            <a:off x="408878" y="1172733"/>
+            <a:ext cx="5687122" cy="4001095"/>
+          </a:xfrm>
+          <a:prstGeom prst="rect">
+            <a:avLst/>
+          </a:prstGeom>
+          <a:noFill/>
+        </p:spPr>
+        <p:txBody>
+          <a:bodyPr wrap="square" rtlCol="0">
+            <a:spAutoFit/>
+          </a:bodyPr>
+          <a:lstStyle/>
+          <a:p>
+            <a:pPr lvl="1"/>
+            <a:endParaRPr lang="en-IN" sz="1600" dirty="0"/>
+          </a:p>
+          <a:p>
+            <a:pPr marL="342900" indent="-342900">
+              <a:buFont typeface="Arial" panose="020B0604020202020204" pitchFamily="34" charset="0"/>
+              <a:buChar char="•"/>
+            </a:pPr>
+            <a:r>
+              <a:rPr lang="en-IN" sz="1600" b="1" dirty="0"/>
+              <a:t>What are impacted devices due to an alert?</a:t>
+            </a:r>
+            <a:br>
+              <a:rPr lang="en-IN" sz="1200" b="1" dirty="0"/>
+            </a:br>
+            <a:r>
+              <a:rPr lang="en-IN" sz="1200" b="1" dirty="0"/>
+              <a:t>Cypher Query:</a:t>
+            </a:r>
+            <a:r>
+              <a:rPr lang="en-IN" sz="1600" b="1" dirty="0"/>
+              <a:t> </a:t>
+            </a:r>
+          </a:p>
+          <a:p>
+            <a:pPr lvl="1"/>
+            <a:r>
+              <a:rPr lang="en-US" sz="1000" i="1" dirty="0"/>
+              <a:t>MATCH (</a:t>
+            </a:r>
+            <a:r>
+              <a:rPr lang="en-US" sz="1000" i="1" dirty="0" err="1"/>
+              <a:t>n:Alert</a:t>
+            </a:r>
+            <a:r>
+              <a:rPr lang="en-US" sz="1000" i="1" dirty="0"/>
+              <a:t> ) WHERE </a:t>
+            </a:r>
+            <a:r>
+              <a:rPr lang="en-US" sz="1000" i="1" dirty="0" err="1"/>
+              <a:t>toLower</a:t>
+            </a:r>
+            <a:r>
+              <a:rPr lang="en-US" sz="1000" i="1" dirty="0"/>
+              <a:t>(</a:t>
+            </a:r>
+            <a:r>
+              <a:rPr lang="en-US" sz="1000" i="1" dirty="0" err="1"/>
+              <a:t>n.name</a:t>
+            </a:r>
+            <a:r>
+              <a:rPr lang="en-US" sz="1000" i="1" dirty="0"/>
+              <a:t>) CONTAINS </a:t>
+            </a:r>
+            <a:r>
+              <a:rPr lang="en-US" sz="1000" i="1" dirty="0" err="1"/>
+              <a:t>toLower</a:t>
+            </a:r>
+            <a:r>
+              <a:rPr lang="en-US" sz="1000" i="1" dirty="0"/>
+              <a:t>('interface is down') </a:t>
+            </a:r>
+          </a:p>
+          <a:p>
+            <a:pPr lvl="1"/>
+            <a:r>
+              <a:rPr lang="en-US" sz="1000" i="1" dirty="0"/>
+              <a:t>MATCH (n)-[</a:t>
+            </a:r>
+            <a:r>
+              <a:rPr lang="en-US" sz="1000" i="1" dirty="0" err="1"/>
+              <a:t>r:CORRELATED_AT</a:t>
+            </a:r>
+            <a:r>
+              <a:rPr lang="en-US" sz="1000" i="1" dirty="0"/>
+              <a:t>]-(</a:t>
+            </a:r>
+            <a:r>
+              <a:rPr lang="en-US" sz="1000" i="1" dirty="0" err="1"/>
+              <a:t>asso_alert</a:t>
+            </a:r>
+            <a:r>
+              <a:rPr lang="en-US" sz="1000" i="1" dirty="0"/>
+              <a:t>) </a:t>
+            </a:r>
+          </a:p>
+          <a:p>
+            <a:pPr lvl="1"/>
+            <a:r>
+              <a:rPr lang="en-US" sz="1000" i="1" dirty="0"/>
+              <a:t>with </a:t>
+            </a:r>
+            <a:r>
+              <a:rPr lang="en-US" sz="1000" i="1" dirty="0" err="1"/>
+              <a:t>n,asso_alert</a:t>
+            </a:r>
+            <a:r>
+              <a:rPr lang="en-US" sz="1000" i="1" dirty="0"/>
+              <a:t>, r ORDER BY </a:t>
+            </a:r>
+            <a:r>
+              <a:rPr lang="en-US" sz="1000" i="1" dirty="0" err="1"/>
+              <a:t>r.mutual_information</a:t>
+            </a:r>
+            <a:r>
+              <a:rPr lang="en-US" sz="1000" i="1" dirty="0"/>
+              <a:t> DESC limit 5 </a:t>
+            </a:r>
+          </a:p>
+          <a:p>
+            <a:pPr lvl="1"/>
+            <a:r>
+              <a:rPr lang="en-US" sz="1000" i="1" dirty="0"/>
+              <a:t>optional MATCH (n )-[</a:t>
+            </a:r>
+            <a:r>
+              <a:rPr lang="en-US" sz="1000" i="1" dirty="0" err="1"/>
+              <a:t>ar</a:t>
+            </a:r>
+            <a:r>
+              <a:rPr lang="en-US" sz="1000" i="1" dirty="0"/>
+              <a:t>]-(</a:t>
+            </a:r>
+            <a:r>
+              <a:rPr lang="en-US" sz="1000" i="1" dirty="0" err="1"/>
+              <a:t>c:CI</a:t>
+            </a:r>
+            <a:r>
+              <a:rPr lang="en-US" sz="1000" i="1" dirty="0"/>
+              <a:t>), (</a:t>
+            </a:r>
+            <a:r>
+              <a:rPr lang="en-US" sz="1000" i="1" dirty="0" err="1"/>
+              <a:t>c:CI</a:t>
+            </a:r>
+            <a:r>
+              <a:rPr lang="en-US" sz="1000" i="1" dirty="0"/>
+              <a:t>)-[ci]-(</a:t>
+            </a:r>
+            <a:r>
+              <a:rPr lang="en-US" sz="1000" i="1" dirty="0" err="1"/>
+              <a:t>i:Interval</a:t>
+            </a:r>
+            <a:r>
+              <a:rPr lang="en-US" sz="1000" i="1" dirty="0"/>
+              <a:t>) </a:t>
+            </a:r>
+          </a:p>
+          <a:p>
+            <a:pPr lvl="1"/>
+            <a:r>
+              <a:rPr lang="en-US" sz="1000" i="1" dirty="0"/>
+              <a:t>WHERE </a:t>
+            </a:r>
+            <a:r>
+              <a:rPr lang="en-US" sz="1000" i="1" dirty="0" err="1"/>
+              <a:t>i.date</a:t>
+            </a:r>
+            <a:r>
+              <a:rPr lang="en-US" sz="1000" i="1" dirty="0"/>
+              <a:t> &gt;= '11-23-2021' AND </a:t>
+            </a:r>
+            <a:r>
+              <a:rPr lang="en-US" sz="1000" i="1" dirty="0" err="1"/>
+              <a:t>i.startTime</a:t>
+            </a:r>
+            <a:r>
+              <a:rPr lang="en-US" sz="1000" i="1" dirty="0"/>
+              <a:t> &gt;= '17:00' AND </a:t>
+            </a:r>
+            <a:r>
+              <a:rPr lang="en-US" sz="1000" i="1" dirty="0" err="1"/>
+              <a:t>i.date</a:t>
+            </a:r>
+            <a:r>
+              <a:rPr lang="en-US" sz="1000" i="1" dirty="0"/>
+              <a:t> &lt;= '11-23-2021' AND </a:t>
+            </a:r>
+            <a:r>
+              <a:rPr lang="en-US" sz="1000" i="1" dirty="0" err="1"/>
+              <a:t>i.endTime</a:t>
+            </a:r>
+            <a:r>
+              <a:rPr lang="en-US" sz="1000" i="1" dirty="0"/>
+              <a:t> &lt;= '18:00'</a:t>
+            </a:r>
+          </a:p>
+          <a:p>
+            <a:pPr lvl="1"/>
+            <a:r>
+              <a:rPr lang="en-US" sz="1000" i="1" dirty="0"/>
+              <a:t>return c as ci ,(n )-[</a:t>
+            </a:r>
+            <a:r>
+              <a:rPr lang="en-US" sz="1000" i="1" dirty="0" err="1"/>
+              <a:t>ar</a:t>
+            </a:r>
+            <a:r>
+              <a:rPr lang="en-US" sz="1000" i="1" dirty="0"/>
+              <a:t>]-(</a:t>
+            </a:r>
+            <a:r>
+              <a:rPr lang="en-US" sz="1000" i="1" dirty="0" err="1"/>
+              <a:t>c:CI</a:t>
+            </a:r>
+            <a:r>
+              <a:rPr lang="en-US" sz="1000" i="1" dirty="0"/>
+              <a:t>) as </a:t>
+            </a:r>
+            <a:r>
+              <a:rPr lang="en-US" sz="1000" i="1" dirty="0" err="1"/>
+              <a:t>ar</a:t>
+            </a:r>
+            <a:r>
+              <a:rPr lang="en-US" sz="1000" i="1" dirty="0"/>
+              <a:t> </a:t>
+            </a:r>
+          </a:p>
+          <a:p>
+            <a:pPr lvl="1"/>
+            <a:r>
+              <a:rPr lang="en-US" sz="1000" i="1" dirty="0"/>
+              <a:t>UNION </a:t>
+            </a:r>
+          </a:p>
+          <a:p>
+            <a:pPr lvl="1"/>
+            <a:r>
+              <a:rPr lang="en-US" sz="1000" i="1" dirty="0"/>
+              <a:t>MATCH (</a:t>
+            </a:r>
+            <a:r>
+              <a:rPr lang="en-US" sz="1000" i="1" dirty="0" err="1"/>
+              <a:t>n:Alert</a:t>
+            </a:r>
+            <a:r>
+              <a:rPr lang="en-US" sz="1000" i="1" dirty="0"/>
+              <a:t> ) WHERE </a:t>
+            </a:r>
+            <a:r>
+              <a:rPr lang="en-US" sz="1000" i="1" dirty="0" err="1"/>
+              <a:t>toLower</a:t>
+            </a:r>
+            <a:r>
+              <a:rPr lang="en-US" sz="1000" i="1" dirty="0"/>
+              <a:t>(</a:t>
+            </a:r>
+            <a:r>
+              <a:rPr lang="en-US" sz="1000" i="1" dirty="0" err="1"/>
+              <a:t>n.name</a:t>
+            </a:r>
+            <a:r>
+              <a:rPr lang="en-US" sz="1000" i="1" dirty="0"/>
+              <a:t>) CONTAINS </a:t>
+            </a:r>
+            <a:r>
+              <a:rPr lang="en-US" sz="1000" i="1" dirty="0" err="1"/>
+              <a:t>toLower</a:t>
+            </a:r>
+            <a:r>
+              <a:rPr lang="en-US" sz="1000" i="1" dirty="0"/>
+              <a:t>('interface is down') </a:t>
+            </a:r>
+          </a:p>
+          <a:p>
+            <a:pPr lvl="1"/>
+            <a:r>
+              <a:rPr lang="en-US" sz="1000" i="1" dirty="0"/>
+              <a:t>MATCH (n)-[</a:t>
+            </a:r>
+            <a:r>
+              <a:rPr lang="en-US" sz="1000" i="1" dirty="0" err="1"/>
+              <a:t>r:CORRELATED_AT</a:t>
+            </a:r>
+            <a:r>
+              <a:rPr lang="en-US" sz="1000" i="1" dirty="0"/>
+              <a:t>]-(</a:t>
+            </a:r>
+            <a:r>
+              <a:rPr lang="en-US" sz="1000" i="1" dirty="0" err="1"/>
+              <a:t>asso_alert</a:t>
+            </a:r>
+            <a:r>
+              <a:rPr lang="en-US" sz="1000" i="1" dirty="0"/>
+              <a:t>) </a:t>
+            </a:r>
+          </a:p>
+          <a:p>
+            <a:pPr lvl="1"/>
+            <a:r>
+              <a:rPr lang="en-US" sz="1000" i="1" dirty="0"/>
+              <a:t>with </a:t>
+            </a:r>
+            <a:r>
+              <a:rPr lang="en-US" sz="1000" i="1" dirty="0" err="1"/>
+              <a:t>n,asso_alert</a:t>
+            </a:r>
+            <a:r>
+              <a:rPr lang="en-US" sz="1000" i="1" dirty="0"/>
+              <a:t>, r ORDER BY </a:t>
+            </a:r>
+            <a:r>
+              <a:rPr lang="en-US" sz="1000" i="1" dirty="0" err="1"/>
+              <a:t>r.mutual_information</a:t>
+            </a:r>
+            <a:r>
+              <a:rPr lang="en-US" sz="1000" i="1" dirty="0"/>
+              <a:t> DESC limit 5 </a:t>
+            </a:r>
+          </a:p>
+          <a:p>
+            <a:pPr lvl="1"/>
+            <a:r>
+              <a:rPr lang="en-US" sz="1000" i="1" dirty="0"/>
+              <a:t>optional MATCH (</a:t>
+            </a:r>
+            <a:r>
+              <a:rPr lang="en-US" sz="1000" i="1" dirty="0" err="1"/>
+              <a:t>asso_alert</a:t>
+            </a:r>
+            <a:r>
+              <a:rPr lang="en-US" sz="1000" i="1" dirty="0"/>
+              <a:t> )-[</a:t>
+            </a:r>
+            <a:r>
+              <a:rPr lang="en-US" sz="1000" i="1" dirty="0" err="1"/>
+              <a:t>ar</a:t>
+            </a:r>
+            <a:r>
+              <a:rPr lang="en-US" sz="1000" i="1" dirty="0"/>
+              <a:t>]-(</a:t>
+            </a:r>
+            <a:r>
+              <a:rPr lang="en-US" sz="1000" i="1" dirty="0" err="1"/>
+              <a:t>c:CI</a:t>
+            </a:r>
+            <a:r>
+              <a:rPr lang="en-US" sz="1000" i="1" dirty="0"/>
+              <a:t>), (</a:t>
+            </a:r>
+            <a:r>
+              <a:rPr lang="en-US" sz="1000" i="1" dirty="0" err="1"/>
+              <a:t>c:CI</a:t>
+            </a:r>
+            <a:r>
+              <a:rPr lang="en-US" sz="1000" i="1" dirty="0"/>
+              <a:t>)-[ci]-(</a:t>
+            </a:r>
+            <a:r>
+              <a:rPr lang="en-US" sz="1000" i="1" dirty="0" err="1"/>
+              <a:t>i:Interval</a:t>
+            </a:r>
+            <a:r>
+              <a:rPr lang="en-US" sz="1000" i="1" dirty="0"/>
+              <a:t>) </a:t>
+            </a:r>
+          </a:p>
+          <a:p>
+            <a:pPr lvl="1"/>
+            <a:r>
+              <a:rPr lang="en-US" sz="1000" i="1" dirty="0"/>
+              <a:t>WHERE </a:t>
+            </a:r>
+            <a:r>
+              <a:rPr lang="en-US" sz="1000" i="1" dirty="0" err="1"/>
+              <a:t>i.date</a:t>
+            </a:r>
+            <a:r>
+              <a:rPr lang="en-US" sz="1000" i="1" dirty="0"/>
+              <a:t> &gt;= '11-23-2021' AND </a:t>
+            </a:r>
+            <a:r>
+              <a:rPr lang="en-US" sz="1000" i="1" dirty="0" err="1"/>
+              <a:t>i.startTime</a:t>
+            </a:r>
+            <a:r>
+              <a:rPr lang="en-US" sz="1000" i="1" dirty="0"/>
+              <a:t> &gt;= '17:00' AND </a:t>
+            </a:r>
+            <a:r>
+              <a:rPr lang="en-US" sz="1000" i="1" dirty="0" err="1"/>
+              <a:t>i.date</a:t>
+            </a:r>
+            <a:r>
+              <a:rPr lang="en-US" sz="1000" i="1" dirty="0"/>
+              <a:t> &lt;= '11-23-2021' AND </a:t>
+            </a:r>
+            <a:r>
+              <a:rPr lang="en-US" sz="1000" i="1" dirty="0" err="1"/>
+              <a:t>i.endTime</a:t>
+            </a:r>
+            <a:r>
+              <a:rPr lang="en-US" sz="1000" i="1" dirty="0"/>
+              <a:t> &lt;= '18:00'</a:t>
+            </a:r>
+          </a:p>
+          <a:p>
+            <a:pPr lvl="1"/>
+            <a:r>
+              <a:rPr lang="en-US" sz="1000" i="1" dirty="0"/>
+              <a:t>return c as ci ,(</a:t>
+            </a:r>
+            <a:r>
+              <a:rPr lang="en-US" sz="1000" i="1" dirty="0" err="1"/>
+              <a:t>asso_alert</a:t>
+            </a:r>
+            <a:r>
+              <a:rPr lang="en-US" sz="1000" i="1" dirty="0"/>
+              <a:t> )-[</a:t>
+            </a:r>
+            <a:r>
+              <a:rPr lang="en-US" sz="1000" i="1" dirty="0" err="1"/>
+              <a:t>ar</a:t>
+            </a:r>
+            <a:r>
+              <a:rPr lang="en-US" sz="1000" i="1" dirty="0"/>
+              <a:t>]-(</a:t>
+            </a:r>
+            <a:r>
+              <a:rPr lang="en-US" sz="1000" i="1" dirty="0" err="1"/>
+              <a:t>c:CI</a:t>
+            </a:r>
+            <a:r>
+              <a:rPr lang="en-US" sz="1000" i="1" dirty="0"/>
+              <a:t>) as </a:t>
+            </a:r>
+            <a:r>
+              <a:rPr lang="en-US" sz="1000" i="1" dirty="0" err="1"/>
+              <a:t>ar</a:t>
+            </a:r>
+            <a:r>
+              <a:rPr lang="en-US" sz="1000" i="1" dirty="0"/>
+              <a:t> </a:t>
+            </a:r>
+            <a:endParaRPr lang="en-IN" sz="1600" b="1" dirty="0"/>
+          </a:p>
+          <a:p>
+            <a:pPr marL="342900" indent="-342900">
+              <a:buFont typeface="Arial" panose="020B0604020202020204" pitchFamily="34" charset="0"/>
+              <a:buChar char="•"/>
+            </a:pPr>
+            <a:endParaRPr lang="en-IN" sz="1600" dirty="0"/>
+          </a:p>
+          <a:p>
+            <a:pPr marL="342900" indent="-342900">
+              <a:buFont typeface="Arial" panose="020B0604020202020204" pitchFamily="34" charset="0"/>
+              <a:buChar char="•"/>
+            </a:pPr>
+            <a:endParaRPr lang="en-IN" sz="1600" dirty="0"/>
+          </a:p>
+          <a:p>
+            <a:pPr lvl="1"/>
+            <a:br>
+              <a:rPr lang="en-IN" sz="1200" dirty="0"/>
+            </a:br>
+            <a:endParaRPr lang="en-IN" sz="1200" dirty="0">
+              <a:solidFill>
+                <a:srgbClr val="FF0000"/>
+              </a:solidFill>
+            </a:endParaRPr>
+          </a:p>
+        </p:txBody>
+      </p:sp>
+      <p:pic>
+        <p:nvPicPr>
+          <p:cNvPr id="37" name="Picture 36">
+            <a:extLst>
+              <a:ext uri="{FF2B5EF4-FFF2-40B4-BE49-F238E27FC236}">
+                <a16:creationId xmlns:a16="http://schemas.microsoft.com/office/drawing/2014/main" id="{16092B74-553A-B94C-B221-D87167864F61}"/>
+              </a:ext>
+            </a:extLst>
+          </p:cNvPr>
+          <p:cNvPicPr>
+            <a:picLocks noChangeAspect="1"/>
+          </p:cNvPicPr>
+          <p:nvPr/>
+        </p:nvPicPr>
+        <p:blipFill>
+          <a:blip r:embed="rId2"/>
+          <a:stretch>
+            <a:fillRect/>
+          </a:stretch>
+        </p:blipFill>
+        <p:spPr>
+          <a:xfrm>
+            <a:off x="1239976" y="4370935"/>
+            <a:ext cx="2948245" cy="1899444"/>
+          </a:xfrm>
+          <a:prstGeom prst="rect">
+            <a:avLst/>
+          </a:prstGeom>
+        </p:spPr>
+      </p:pic>
+      <p:sp>
+        <p:nvSpPr>
+          <p:cNvPr id="41" name="TextBox 40">
+            <a:extLst>
+              <a:ext uri="{FF2B5EF4-FFF2-40B4-BE49-F238E27FC236}">
+                <a16:creationId xmlns:a16="http://schemas.microsoft.com/office/drawing/2014/main" id="{37C83772-97F3-724D-A447-BEDB398BB703}"/>
+              </a:ext>
+            </a:extLst>
+          </p:cNvPr>
+          <p:cNvSpPr txBox="1"/>
+          <p:nvPr/>
+        </p:nvSpPr>
+        <p:spPr>
+          <a:xfrm>
+            <a:off x="5952781" y="1192294"/>
+            <a:ext cx="5687122" cy="4001095"/>
+          </a:xfrm>
+          <a:prstGeom prst="rect">
+            <a:avLst/>
+          </a:prstGeom>
+          <a:noFill/>
+        </p:spPr>
+        <p:txBody>
+          <a:bodyPr wrap="square" rtlCol="0">
+            <a:spAutoFit/>
+          </a:bodyPr>
+          <a:lstStyle/>
+          <a:p>
+            <a:pPr lvl="1"/>
+            <a:endParaRPr lang="en-IN" sz="1600" dirty="0"/>
+          </a:p>
+          <a:p>
+            <a:pPr marL="342900" indent="-342900">
+              <a:buFont typeface="Arial" panose="020B0604020202020204" pitchFamily="34" charset="0"/>
+              <a:buChar char="•"/>
+            </a:pPr>
+            <a:r>
+              <a:rPr lang="en-IN" sz="1600" b="1" dirty="0"/>
+              <a:t>What are the Unhealthy services?</a:t>
+            </a:r>
+            <a:br>
+              <a:rPr lang="en-IN" sz="1200" b="1" dirty="0"/>
+            </a:br>
+            <a:r>
+              <a:rPr lang="en-IN" sz="1200" b="1" dirty="0"/>
+              <a:t>Cypher Query:</a:t>
+            </a:r>
+            <a:r>
+              <a:rPr lang="en-IN" sz="1600" b="1" dirty="0"/>
+              <a:t> </a:t>
+            </a:r>
+          </a:p>
+          <a:p>
+            <a:pPr lvl="1"/>
+            <a:r>
+              <a:rPr lang="en-US" sz="1000" i="1" dirty="0"/>
+              <a:t>MATCH (</a:t>
+            </a:r>
+            <a:r>
+              <a:rPr lang="en-US" sz="1000" i="1" dirty="0" err="1"/>
+              <a:t>n:Alert</a:t>
+            </a:r>
+            <a:r>
+              <a:rPr lang="en-US" sz="1000" i="1" dirty="0"/>
+              <a:t> ) WHERE </a:t>
+            </a:r>
+            <a:r>
+              <a:rPr lang="en-US" sz="1000" i="1" dirty="0" err="1"/>
+              <a:t>toLower</a:t>
+            </a:r>
+            <a:r>
+              <a:rPr lang="en-US" sz="1000" i="1" dirty="0"/>
+              <a:t>(</a:t>
+            </a:r>
+            <a:r>
+              <a:rPr lang="en-US" sz="1000" i="1" dirty="0" err="1"/>
+              <a:t>n.name</a:t>
+            </a:r>
+            <a:r>
+              <a:rPr lang="en-US" sz="1000" i="1" dirty="0"/>
+              <a:t>) CONTAINS </a:t>
+            </a:r>
+            <a:r>
+              <a:rPr lang="en-US" sz="1000" i="1" dirty="0" err="1"/>
+              <a:t>toLower</a:t>
+            </a:r>
+            <a:r>
+              <a:rPr lang="en-US" sz="1000" i="1" dirty="0"/>
+              <a:t>('interface is down') </a:t>
+            </a:r>
+          </a:p>
+          <a:p>
+            <a:pPr lvl="1"/>
+            <a:r>
+              <a:rPr lang="en-US" sz="1000" i="1" dirty="0"/>
+              <a:t>MATCH (n)-[</a:t>
+            </a:r>
+            <a:r>
+              <a:rPr lang="en-US" sz="1000" i="1" dirty="0" err="1"/>
+              <a:t>r:CORRELATED_AT</a:t>
+            </a:r>
+            <a:r>
+              <a:rPr lang="en-US" sz="1000" i="1" dirty="0"/>
+              <a:t>]-(</a:t>
+            </a:r>
+            <a:r>
+              <a:rPr lang="en-US" sz="1000" i="1" dirty="0" err="1"/>
+              <a:t>asso_alert</a:t>
+            </a:r>
+            <a:r>
+              <a:rPr lang="en-US" sz="1000" i="1" dirty="0"/>
+              <a:t>) </a:t>
+            </a:r>
+          </a:p>
+          <a:p>
+            <a:pPr lvl="1"/>
+            <a:r>
+              <a:rPr lang="en-US" sz="1000" i="1" dirty="0"/>
+              <a:t>with </a:t>
+            </a:r>
+            <a:r>
+              <a:rPr lang="en-US" sz="1000" i="1" dirty="0" err="1"/>
+              <a:t>n,asso_alert</a:t>
+            </a:r>
+            <a:r>
+              <a:rPr lang="en-US" sz="1000" i="1" dirty="0"/>
+              <a:t>, r ORDER BY </a:t>
+            </a:r>
+            <a:r>
+              <a:rPr lang="en-US" sz="1000" i="1" dirty="0" err="1"/>
+              <a:t>r.mutual_information</a:t>
+            </a:r>
+            <a:r>
+              <a:rPr lang="en-US" sz="1000" i="1" dirty="0"/>
+              <a:t> DESC limit 5 </a:t>
+            </a:r>
+          </a:p>
+          <a:p>
+            <a:pPr lvl="1"/>
+            <a:r>
+              <a:rPr lang="en-US" sz="1000" i="1" dirty="0"/>
+              <a:t>optional MATCH (n )-[</a:t>
+            </a:r>
+            <a:r>
+              <a:rPr lang="en-US" sz="1000" i="1" dirty="0" err="1"/>
+              <a:t>ar</a:t>
+            </a:r>
+            <a:r>
+              <a:rPr lang="en-US" sz="1000" i="1" dirty="0"/>
+              <a:t>]-(</a:t>
+            </a:r>
+            <a:r>
+              <a:rPr lang="en-US" sz="1000" i="1" dirty="0" err="1"/>
+              <a:t>c:CI</a:t>
+            </a:r>
+            <a:r>
+              <a:rPr lang="en-US" sz="1000" i="1" dirty="0"/>
+              <a:t>), (</a:t>
+            </a:r>
+            <a:r>
+              <a:rPr lang="en-US" sz="1000" i="1" dirty="0" err="1"/>
+              <a:t>c:CI</a:t>
+            </a:r>
+            <a:r>
+              <a:rPr lang="en-US" sz="1000" i="1" dirty="0"/>
+              <a:t>)-[ci]-(</a:t>
+            </a:r>
+            <a:r>
+              <a:rPr lang="en-US" sz="1000" i="1" dirty="0" err="1"/>
+              <a:t>i:Interval</a:t>
+            </a:r>
+            <a:r>
+              <a:rPr lang="en-US" sz="1000" i="1" dirty="0"/>
+              <a:t>), (</a:t>
+            </a:r>
+            <a:r>
+              <a:rPr lang="en-US" sz="1000" i="1" dirty="0" err="1"/>
+              <a:t>c:CI</a:t>
+            </a:r>
+            <a:r>
+              <a:rPr lang="en-US" sz="1000" i="1" dirty="0"/>
+              <a:t>)-[]-(</a:t>
+            </a:r>
+            <a:r>
+              <a:rPr lang="en-US" sz="1000" i="1" dirty="0" err="1"/>
+              <a:t>s:Service</a:t>
+            </a:r>
+            <a:r>
+              <a:rPr lang="en-US" sz="1000" i="1" dirty="0"/>
+              <a:t>) </a:t>
+            </a:r>
+          </a:p>
+          <a:p>
+            <a:pPr lvl="1"/>
+            <a:r>
+              <a:rPr lang="en-US" sz="1000" i="1" dirty="0"/>
+              <a:t>WHERE </a:t>
+            </a:r>
+            <a:r>
+              <a:rPr lang="en-US" sz="1000" i="1" dirty="0" err="1"/>
+              <a:t>i.date</a:t>
+            </a:r>
+            <a:r>
+              <a:rPr lang="en-US" sz="1000" i="1" dirty="0"/>
+              <a:t> &gt;= '11-23-2021' AND </a:t>
+            </a:r>
+            <a:r>
+              <a:rPr lang="en-US" sz="1000" i="1" dirty="0" err="1"/>
+              <a:t>i.startTime</a:t>
+            </a:r>
+            <a:r>
+              <a:rPr lang="en-US" sz="1000" i="1" dirty="0"/>
+              <a:t> &gt;= '17:00' AND </a:t>
+            </a:r>
+            <a:r>
+              <a:rPr lang="en-US" sz="1000" i="1" dirty="0" err="1"/>
+              <a:t>i.date</a:t>
+            </a:r>
+            <a:r>
+              <a:rPr lang="en-US" sz="1000" i="1" dirty="0"/>
+              <a:t> &lt;= '11-23-2021' AND </a:t>
+            </a:r>
+            <a:r>
+              <a:rPr lang="en-US" sz="1000" i="1" dirty="0" err="1"/>
+              <a:t>i.endTime</a:t>
+            </a:r>
+            <a:r>
+              <a:rPr lang="en-US" sz="1000" i="1" dirty="0"/>
+              <a:t> &lt;= '23:00'</a:t>
+            </a:r>
+          </a:p>
+          <a:p>
+            <a:pPr lvl="1"/>
+            <a:r>
+              <a:rPr lang="en-US" sz="1000" i="1" dirty="0"/>
+              <a:t>return c as ci ,(n )-[</a:t>
+            </a:r>
+            <a:r>
+              <a:rPr lang="en-US" sz="1000" i="1" dirty="0" err="1"/>
+              <a:t>ar</a:t>
+            </a:r>
+            <a:r>
+              <a:rPr lang="en-US" sz="1000" i="1" dirty="0"/>
+              <a:t>]-(</a:t>
+            </a:r>
+            <a:r>
+              <a:rPr lang="en-US" sz="1000" i="1" dirty="0" err="1"/>
+              <a:t>c:CI</a:t>
+            </a:r>
+            <a:r>
+              <a:rPr lang="en-US" sz="1000" i="1" dirty="0"/>
+              <a:t>) as </a:t>
+            </a:r>
+            <a:r>
+              <a:rPr lang="en-US" sz="1000" i="1" dirty="0" err="1"/>
+              <a:t>ar</a:t>
+            </a:r>
+            <a:r>
+              <a:rPr lang="en-US" sz="1000" i="1" dirty="0"/>
+              <a:t> , </a:t>
+            </a:r>
+            <a:r>
+              <a:rPr lang="en-US" sz="1000" i="1" dirty="0" err="1"/>
+              <a:t>i</a:t>
+            </a:r>
+            <a:r>
+              <a:rPr lang="en-US" sz="1000" i="1" dirty="0"/>
+              <a:t>, (</a:t>
+            </a:r>
+            <a:r>
+              <a:rPr lang="en-US" sz="1000" i="1" dirty="0" err="1"/>
+              <a:t>c:CI</a:t>
+            </a:r>
+            <a:r>
+              <a:rPr lang="en-US" sz="1000" i="1" dirty="0"/>
+              <a:t>)-[]-(</a:t>
+            </a:r>
+            <a:r>
+              <a:rPr lang="en-US" sz="1000" i="1" dirty="0" err="1"/>
+              <a:t>s:Service</a:t>
+            </a:r>
+            <a:r>
+              <a:rPr lang="en-US" sz="1000" i="1" dirty="0"/>
+              <a:t>) as cis, s </a:t>
+            </a:r>
+          </a:p>
+          <a:p>
+            <a:pPr lvl="1"/>
+            <a:r>
+              <a:rPr lang="en-US" sz="1000" i="1" dirty="0"/>
+              <a:t>UNION </a:t>
+            </a:r>
+          </a:p>
+          <a:p>
+            <a:pPr lvl="1"/>
+            <a:r>
+              <a:rPr lang="en-US" sz="1000" i="1" dirty="0"/>
+              <a:t>MATCH (</a:t>
+            </a:r>
+            <a:r>
+              <a:rPr lang="en-US" sz="1000" i="1" dirty="0" err="1"/>
+              <a:t>n:Alert</a:t>
+            </a:r>
+            <a:r>
+              <a:rPr lang="en-US" sz="1000" i="1" dirty="0"/>
+              <a:t> ) WHERE </a:t>
+            </a:r>
+            <a:r>
+              <a:rPr lang="en-US" sz="1000" i="1" dirty="0" err="1"/>
+              <a:t>toLower</a:t>
+            </a:r>
+            <a:r>
+              <a:rPr lang="en-US" sz="1000" i="1" dirty="0"/>
+              <a:t>(</a:t>
+            </a:r>
+            <a:r>
+              <a:rPr lang="en-US" sz="1000" i="1" dirty="0" err="1"/>
+              <a:t>n.name</a:t>
+            </a:r>
+            <a:r>
+              <a:rPr lang="en-US" sz="1000" i="1" dirty="0"/>
+              <a:t>) CONTAINS </a:t>
+            </a:r>
+            <a:r>
+              <a:rPr lang="en-US" sz="1000" i="1" dirty="0" err="1"/>
+              <a:t>toLower</a:t>
+            </a:r>
+            <a:r>
+              <a:rPr lang="en-US" sz="1000" i="1" dirty="0"/>
+              <a:t>('interface is down') </a:t>
+            </a:r>
+          </a:p>
+          <a:p>
+            <a:pPr lvl="1"/>
+            <a:r>
+              <a:rPr lang="en-US" sz="1000" i="1" dirty="0"/>
+              <a:t>MATCH (n)-[</a:t>
+            </a:r>
+            <a:r>
+              <a:rPr lang="en-US" sz="1000" i="1" dirty="0" err="1"/>
+              <a:t>r:CORRELATED_AT</a:t>
+            </a:r>
+            <a:r>
+              <a:rPr lang="en-US" sz="1000" i="1" dirty="0"/>
+              <a:t>]-(</a:t>
+            </a:r>
+            <a:r>
+              <a:rPr lang="en-US" sz="1000" i="1" dirty="0" err="1"/>
+              <a:t>asso_alert</a:t>
+            </a:r>
+            <a:r>
+              <a:rPr lang="en-US" sz="1000" i="1" dirty="0"/>
+              <a:t>) </a:t>
+            </a:r>
+          </a:p>
+          <a:p>
+            <a:pPr lvl="1"/>
+            <a:r>
+              <a:rPr lang="en-US" sz="1000" i="1" dirty="0"/>
+              <a:t>with </a:t>
+            </a:r>
+            <a:r>
+              <a:rPr lang="en-US" sz="1000" i="1" dirty="0" err="1"/>
+              <a:t>n,asso_alert</a:t>
+            </a:r>
+            <a:r>
+              <a:rPr lang="en-US" sz="1000" i="1" dirty="0"/>
+              <a:t>, r ORDER BY </a:t>
+            </a:r>
+            <a:r>
+              <a:rPr lang="en-US" sz="1000" i="1" dirty="0" err="1"/>
+              <a:t>r.mutual_information</a:t>
+            </a:r>
+            <a:r>
+              <a:rPr lang="en-US" sz="1000" i="1" dirty="0"/>
+              <a:t> DESC limit 5 </a:t>
+            </a:r>
+          </a:p>
+          <a:p>
+            <a:pPr lvl="1"/>
+            <a:r>
+              <a:rPr lang="en-US" sz="1000" i="1" dirty="0"/>
+              <a:t>optional MATCH (</a:t>
+            </a:r>
+            <a:r>
+              <a:rPr lang="en-US" sz="1000" i="1" dirty="0" err="1"/>
+              <a:t>asso_alert</a:t>
+            </a:r>
+            <a:r>
+              <a:rPr lang="en-US" sz="1000" i="1" dirty="0"/>
+              <a:t> )-[</a:t>
+            </a:r>
+            <a:r>
+              <a:rPr lang="en-US" sz="1000" i="1" dirty="0" err="1"/>
+              <a:t>ar</a:t>
+            </a:r>
+            <a:r>
+              <a:rPr lang="en-US" sz="1000" i="1" dirty="0"/>
+              <a:t>]-(</a:t>
+            </a:r>
+            <a:r>
+              <a:rPr lang="en-US" sz="1000" i="1" dirty="0" err="1"/>
+              <a:t>c:CI</a:t>
+            </a:r>
+            <a:r>
+              <a:rPr lang="en-US" sz="1000" i="1" dirty="0"/>
+              <a:t>), (</a:t>
+            </a:r>
+            <a:r>
+              <a:rPr lang="en-US" sz="1000" i="1" dirty="0" err="1"/>
+              <a:t>c:CI</a:t>
+            </a:r>
+            <a:r>
+              <a:rPr lang="en-US" sz="1000" i="1" dirty="0"/>
+              <a:t>)-[ci]-(</a:t>
+            </a:r>
+            <a:r>
+              <a:rPr lang="en-US" sz="1000" i="1" dirty="0" err="1"/>
+              <a:t>i:Interval</a:t>
+            </a:r>
+            <a:r>
+              <a:rPr lang="en-US" sz="1000" i="1" dirty="0"/>
+              <a:t>), (</a:t>
+            </a:r>
+            <a:r>
+              <a:rPr lang="en-US" sz="1000" i="1" dirty="0" err="1"/>
+              <a:t>c:CI</a:t>
+            </a:r>
+            <a:r>
+              <a:rPr lang="en-US" sz="1000" i="1" dirty="0"/>
+              <a:t>)-[]-(</a:t>
+            </a:r>
+            <a:r>
+              <a:rPr lang="en-US" sz="1000" i="1" dirty="0" err="1"/>
+              <a:t>s:Service</a:t>
+            </a:r>
+            <a:r>
+              <a:rPr lang="en-US" sz="1000" i="1" dirty="0"/>
+              <a:t>) </a:t>
+            </a:r>
+          </a:p>
+          <a:p>
+            <a:pPr lvl="1"/>
+            <a:r>
+              <a:rPr lang="en-US" sz="1000" i="1" dirty="0"/>
+              <a:t>WHERE </a:t>
+            </a:r>
+            <a:r>
+              <a:rPr lang="en-US" sz="1000" i="1" dirty="0" err="1"/>
+              <a:t>i.date</a:t>
+            </a:r>
+            <a:r>
+              <a:rPr lang="en-US" sz="1000" i="1" dirty="0"/>
+              <a:t> &gt;= '11-23-2021' AND </a:t>
+            </a:r>
+            <a:r>
+              <a:rPr lang="en-US" sz="1000" i="1" dirty="0" err="1"/>
+              <a:t>i.startTime</a:t>
+            </a:r>
+            <a:r>
+              <a:rPr lang="en-US" sz="1000" i="1" dirty="0"/>
+              <a:t> &gt;= '17:00' AND </a:t>
+            </a:r>
+            <a:r>
+              <a:rPr lang="en-US" sz="1000" i="1" dirty="0" err="1"/>
+              <a:t>i.date</a:t>
+            </a:r>
+            <a:r>
+              <a:rPr lang="en-US" sz="1000" i="1" dirty="0"/>
+              <a:t> &lt;= '11-23-2021' AND </a:t>
+            </a:r>
+            <a:r>
+              <a:rPr lang="en-US" sz="1000" i="1" dirty="0" err="1"/>
+              <a:t>i.endTime</a:t>
+            </a:r>
+            <a:r>
+              <a:rPr lang="en-US" sz="1000" i="1" dirty="0"/>
+              <a:t> &lt;= '23:00'</a:t>
+            </a:r>
+          </a:p>
+          <a:p>
+            <a:pPr lvl="1"/>
+            <a:r>
+              <a:rPr lang="en-US" sz="1000" i="1" dirty="0"/>
+              <a:t>return c as ci ,(</a:t>
+            </a:r>
+            <a:r>
+              <a:rPr lang="en-US" sz="1000" i="1" dirty="0" err="1"/>
+              <a:t>asso_alert</a:t>
+            </a:r>
+            <a:r>
+              <a:rPr lang="en-US" sz="1000" i="1" dirty="0"/>
+              <a:t> )-[</a:t>
+            </a:r>
+            <a:r>
+              <a:rPr lang="en-US" sz="1000" i="1" dirty="0" err="1"/>
+              <a:t>ar</a:t>
+            </a:r>
+            <a:r>
+              <a:rPr lang="en-US" sz="1000" i="1" dirty="0"/>
+              <a:t>]-(</a:t>
+            </a:r>
+            <a:r>
+              <a:rPr lang="en-US" sz="1000" i="1" dirty="0" err="1"/>
+              <a:t>c:CI</a:t>
+            </a:r>
+            <a:r>
+              <a:rPr lang="en-US" sz="1000" i="1" dirty="0"/>
+              <a:t>) as </a:t>
+            </a:r>
+            <a:r>
+              <a:rPr lang="en-US" sz="1000" i="1" dirty="0" err="1"/>
+              <a:t>ar</a:t>
+            </a:r>
+            <a:r>
+              <a:rPr lang="en-US" sz="1000" i="1" dirty="0"/>
+              <a:t> , </a:t>
+            </a:r>
+            <a:r>
+              <a:rPr lang="en-US" sz="1000" i="1" dirty="0" err="1"/>
+              <a:t>i</a:t>
+            </a:r>
+            <a:r>
+              <a:rPr lang="en-US" sz="1000" i="1" dirty="0"/>
+              <a:t>, (</a:t>
+            </a:r>
+            <a:r>
+              <a:rPr lang="en-US" sz="1000" i="1" dirty="0" err="1"/>
+              <a:t>c:CI</a:t>
+            </a:r>
+            <a:r>
+              <a:rPr lang="en-US" sz="1000" i="1" dirty="0"/>
+              <a:t>)-[]-(</a:t>
+            </a:r>
+            <a:r>
+              <a:rPr lang="en-US" sz="1000" i="1" dirty="0" err="1"/>
+              <a:t>s:Service</a:t>
+            </a:r>
+            <a:r>
+              <a:rPr lang="en-US" sz="1000" i="1" dirty="0"/>
+              <a:t>) as cis, s </a:t>
+            </a:r>
+            <a:endParaRPr lang="en-IN" sz="1000" i="1" dirty="0"/>
+          </a:p>
+          <a:p>
+            <a:pPr marL="342900" indent="-342900">
+              <a:buFont typeface="Arial" panose="020B0604020202020204" pitchFamily="34" charset="0"/>
+              <a:buChar char="•"/>
+            </a:pPr>
+            <a:endParaRPr lang="en-IN" sz="1600" dirty="0"/>
+          </a:p>
+          <a:p>
+            <a:pPr marL="342900" indent="-342900">
+              <a:buFont typeface="Arial" panose="020B0604020202020204" pitchFamily="34" charset="0"/>
+              <a:buChar char="•"/>
+            </a:pPr>
+            <a:endParaRPr lang="en-IN" sz="1600" dirty="0"/>
+          </a:p>
+          <a:p>
+            <a:pPr lvl="1"/>
+            <a:br>
+              <a:rPr lang="en-IN" sz="1200" dirty="0"/>
+            </a:br>
+            <a:endParaRPr lang="en-IN" sz="1200" dirty="0">
+              <a:solidFill>
+                <a:srgbClr val="FF0000"/>
+              </a:solidFill>
+            </a:endParaRPr>
+          </a:p>
+        </p:txBody>
+      </p:sp>
+      <p:pic>
+        <p:nvPicPr>
+          <p:cNvPr id="13" name="Picture 12">
+            <a:extLst>
+              <a:ext uri="{FF2B5EF4-FFF2-40B4-BE49-F238E27FC236}">
+                <a16:creationId xmlns:a16="http://schemas.microsoft.com/office/drawing/2014/main" id="{D8E72AE4-F89E-9340-930F-39CA312FE607}"/>
+              </a:ext>
+            </a:extLst>
+          </p:cNvPr>
+          <p:cNvPicPr>
+            <a:picLocks noChangeAspect="1"/>
+          </p:cNvPicPr>
+          <p:nvPr/>
+        </p:nvPicPr>
+        <p:blipFill>
+          <a:blip r:embed="rId3"/>
+          <a:stretch>
+            <a:fillRect/>
+          </a:stretch>
+        </p:blipFill>
+        <p:spPr>
+          <a:xfrm>
+            <a:off x="7006728" y="4307300"/>
+            <a:ext cx="3251218" cy="1932000"/>
+          </a:xfrm>
+          <a:prstGeom prst="rect">
+            <a:avLst/>
+          </a:prstGeom>
+        </p:spPr>
+      </p:pic>
+    </p:spTree>
+    <p:extLst>
+      <p:ext uri="{BB962C8B-B14F-4D97-AF65-F5344CB8AC3E}">
+        <p14:creationId xmlns:p14="http://schemas.microsoft.com/office/powerpoint/2010/main" val="3866287401"/>
+      </p:ext>
+    </p:extLst>
+  </p:cSld>
+  <p:clrMapOvr>
+    <a:masterClrMapping/>
+  </p:clrMapOvr>
+</p:sld>
+</file>
+
+<file path=ppt/slides/slide13.xml><?xml version="1.0" encoding="utf-8"?>
+<p:sld xmlns:a="http://schemas.openxmlformats.org/drawingml/2006/main" xmlns:r="http://schemas.openxmlformats.org/officeDocument/2006/relationships" xmlns:p="http://schemas.openxmlformats.org/presentationml/2006/main">
+  <p:cSld>
+    <p:spTree>
+      <p:nvGrpSpPr>
+        <p:cNvPr id="1" name=""/>
+        <p:cNvGrpSpPr/>
+        <p:nvPr/>
+      </p:nvGrpSpPr>
+      <p:grpSpPr>
+        <a:xfrm>
+          <a:off x="0" y="0"/>
+          <a:ext cx="0" cy="0"/>
+          <a:chOff x="0" y="0"/>
+          <a:chExt cx="0" cy="0"/>
+        </a:xfrm>
+      </p:grpSpPr>
+      <p:sp>
+        <p:nvSpPr>
+          <p:cNvPr id="5" name="TextBox 4">
+            <a:extLst>
+              <a:ext uri="{FF2B5EF4-FFF2-40B4-BE49-F238E27FC236}">
+                <a16:creationId xmlns:a16="http://schemas.microsoft.com/office/drawing/2014/main" id="{1AF10CC2-7967-9B44-A222-6896FA1E60F1}"/>
+              </a:ext>
+            </a:extLst>
+          </p:cNvPr>
+          <p:cNvSpPr txBox="1"/>
+          <p:nvPr/>
+        </p:nvSpPr>
+        <p:spPr>
+          <a:xfrm>
+            <a:off x="418817" y="659135"/>
+            <a:ext cx="9969190" cy="523220"/>
+          </a:xfrm>
+          <a:prstGeom prst="rect">
+            <a:avLst/>
+          </a:prstGeom>
+          <a:noFill/>
+        </p:spPr>
+        <p:txBody>
+          <a:bodyPr wrap="square" rtlCol="0">
+            <a:spAutoFit/>
+          </a:bodyPr>
+          <a:lstStyle/>
+          <a:p>
+            <a:r>
+              <a:rPr lang="en-IN" sz="2800" b="1" dirty="0"/>
               <a:t>Demo</a:t>
             </a:r>
           </a:p>
@@ -4621,7 +6953,7 @@
 </p:sld>
 </file>
 
-<file path=ppt/slides/slide12.xml><?xml version="1.0" encoding="utf-8"?>
+<file path=ppt/slides/slide14.xml><?xml version="1.0" encoding="utf-8"?>
 <p:sld xmlns:a="http://schemas.openxmlformats.org/drawingml/2006/main" xmlns:r="http://schemas.openxmlformats.org/officeDocument/2006/relationships" xmlns:p="http://schemas.openxmlformats.org/presentationml/2006/main">
   <p:cSld>
     <p:bg>
@@ -10500,7 +12832,7 @@
           <a:lstStyle/>
           <a:p>
             <a:r>
-              <a:rPr lang="en-IN" dirty="0"/>
+              <a:rPr lang="en-IN" b="1" dirty="0"/>
               <a:t>How to calculate Mutual Information </a:t>
             </a:r>
           </a:p>
@@ -10872,7 +13204,7 @@
         <p:spPr>
           <a:xfrm>
             <a:off x="408878" y="669074"/>
-            <a:ext cx="9969190" cy="369332"/>
+            <a:ext cx="9969190" cy="523220"/>
           </a:xfrm>
           <a:prstGeom prst="rect">
             <a:avLst/>
@@ -10886,7 +13218,7 @@
           <a:lstStyle/>
           <a:p>
             <a:r>
-              <a:rPr lang="en-IN" b="1" dirty="0"/>
+              <a:rPr lang="en-IN" sz="2800" b="1" dirty="0"/>
               <a:t>Demo</a:t>
             </a:r>
           </a:p>
@@ -11318,7 +13650,7 @@
         </p:nvSpPr>
         <p:spPr>
           <a:xfrm>
-            <a:off x="444500" y="665637"/>
+            <a:off x="400432" y="738663"/>
             <a:ext cx="8661400" cy="774192"/>
           </a:xfrm>
           <a:prstGeom prst="rect">
@@ -11390,7 +13722,7 @@
           <a:p>
             <a:r>
               <a:rPr lang="en-IN" dirty="0"/>
-              <a:t>Neo4jAlert provides</a:t>
+              <a:t>Neo4jAlert library provides</a:t>
             </a:r>
           </a:p>
           <a:p>

</xml_diff>